<commit_message>
Codes related to Data processing
</commit_message>
<xml_diff>
--- a/Flowchart.pptx
+++ b/Flowchart.pptx
@@ -128,46 +128,6 @@
           <inkml:channelProperty channel="F" name="resolution" value="0" units="1/dev"/>
         </inkml:channelProperties>
       </inkml:inkSource>
-      <inkml:timestamp xml:id="ts0" timeString="2019-06-30T05:41:51.062"/>
-    </inkml:context>
-    <inkml:brush xml:id="br0">
-      <inkml:brushProperty name="width" value="0.07056" units="cm"/>
-      <inkml:brushProperty name="height" value="0.07056" units="cm"/>
-      <inkml:brushProperty name="color" value="#70AD47"/>
-    </inkml:brush>
-  </inkml:definitions>
-  <inkml:trace contextRef="#ctx0" brushRef="#br0">42 1644 8027,'5'-22'0,"-2"2"0,-1-3 0,1-2 0,1-5 0,3-2 0,1-3 0,3-2 0,0-1 0,3-1 0,3-1 0,1 0 0,1 0 0,1 0 0,2 1 0,0 0 0,2 1 0,0 0 0,2 2 0,0 1 0,0 2 0,3 0 0,-1 1 0,0 1 0,-4 4 0,-2 3 0,-5 5 0,-1 1 0,1-1 0,-2 3 0,-4 2 0,-2 3 0,-2 3 0,-2 1 0,-2 1 0,0 2 0,0 0 0,-1 0 0,2 0 0,-1 1 0,1-1 0,0 0 0,1 0 0,-1 1 0,0-1 0,0 0 0,-1 0 0,1 0 0,0 1 0,1-1 0,0 0 0,2-1 0,-1 0 0,1-1 0,0 0 0,0 0 0,0 1 0,0 0 0,-1 1 0,-2 1 0,0 1 0,-1 0 0,0 0 0,1 0 0,-1 0 0,1-1 0,2-1 0,1-2 0,0 0 0,1 0 0,0 0 0,-1 0 0,0 0 0,0-1 0,0 1 0,1-2 0,1 1 0,1-2 0,1-1 0,1-1 0,2-1 0,0-1 0,0 2 0,0 0 0,-1 2 0,0-1 0,-1 1 0,0 2 0,-2 0 0,0 2 0,-1-1 0,-2 3 0,-1 0 0,-2 2 0,0 0 0,-1 0 0,-1 5 0,-1 0 0</inkml:trace>
-  <inkml:trace contextRef="#ctx0" brushRef="#br0" timeOffset="1288">276 1452 8027,'7'-46'0,"0"8"0,1 3 0,4-1 0,4-11 0,4-11 0,6-9 0,5-9 0,7-3 0,6-5 0,6-1 0,5-1 0,3 2 0,4 4 0,-9 17 0,-8 12 0,-6 10 0,-7 6 0,-2 3 0,1-1 0,-7 10 0,-2 2 0,-5 5 0,0 1 0,-2 4 0</inkml:trace>
-  <inkml:trace contextRef="#ctx0" brushRef="#br0" timeOffset="1871">239 1779 8027,'1'-35'0,"0"1"0,4-2 0,4-6 0,3-10 0,5-14 0,7-19 0,10-21 0,-12 47 0,1 0 0,4-4 0,2-1 0,6-7 0,2-1 0,1 3 0,1 1 0,4-3 0,0 4 0,-7 18 0,0 2 0,10-11 0,1 1 0,-7 11 0,0 2 0,1-1 0,-2 4 0,20-15 0,-12 14 0,0 0 0,-11 10 0,-7 7 0,1-1 0,-2 3 0,-7 6 0,-11 8 0,-8 9 0</inkml:trace>
-  <inkml:trace contextRef="#ctx0" brushRef="#br0" timeOffset="2328">597 1763 8027,'-17'-47'0,"7"-2"0,17 10 0,8-16 0,9-24 0,7-3 0,7-10 0,-13 40 0,1 1 0,26-36 0,-21 38 0,2 1 0,28-26 0,-7 13 0,-4 10 0,-3 7 0,-6 9 0,-6 4 0,-8 10 0,-3 2 0,1 0 0,-4 3 0,-11 9 0,-1 0 0</inkml:trace>
-  <inkml:trace contextRef="#ctx0" brushRef="#br0" timeOffset="2774">608 1793 8027,'-22'-44'0,"9"3"0,12 0 0,8-5 0,8-31 0,9-18 0,7-12 0,-12 49 0,2 0 0,2-2 0,1 2 0,20-39 0,1 15 0,1 5 0,-3 14 0,-1 5 0,-6 15 0,-7 12 0,3-2 0,-5 10 0,1-1 0,-7 10 0,-1 4 0</inkml:trace>
-  <inkml:trace contextRef="#ctx0" brushRef="#br0" timeOffset="3247">541 1709 8027,'-21'-18'0,"7"-1"0,7-2 0,3-9 0,1-9 0,2-26 0,2-21 0,8-16 0,-1 47 0,1-1 0,2-3 0,1 0 0,3-3 0,1 0 0,1 3 0,2 0 0,0 6 0,1 0 0,1 0 0,0 2 0,19-28 0,6-9 0,-2 13 0,-7 15 0,-7 11 0,-7 12 0,-4 3 0,-2 5 0,2-4 0,-5 12 0,-3 4 0</inkml:trace>
-  <inkml:trace contextRef="#ctx0" brushRef="#br0" timeOffset="3678">207 1642 8027,'-16'-20'0,"3"0"0,6-3 0,1-7 0,2-4 0,2-11 0,1-9 0,8-22 0,5-11 0,10-14 0,8 10 0,7 1 0,4 8 0,7-1 0,-1 17 0,-6 13 0,-6 10 0,-6 11 0,-4 5 0,0 0 0,3-5 0,-4 5 0,-2 0 0</inkml:trace>
-  <inkml:trace contextRef="#ctx0" brushRef="#br0" timeOffset="4191">304 1770 8027,'-6'-46'0,"3"6"0,5 1 0,5-2 0,5-10 0,6-14 0,5-15 0,7-20 0,-12 46 0,2 0 0,1-3 0,2-1 0,1 0 0,1 0 0,2-2 0,1 1 0,-1 7 0,1 2 0,1-1 0,2 2 0,29-38 0,2 3 0,3 1 0,-8 19 0,-6 10 0,-2 6 0,-14 15 0,1-1 0,-2 3 0,-9 8 0,-4 5 0,1-1 0,1 1 0</inkml:trace>
-  <inkml:trace contextRef="#ctx0" brushRef="#br0" timeOffset="4662">118 1865 8027,'-18'-30'0,"7"3"0,8-2 0,5-7 0,5-20 0,4-15 0,10-26 0,4-12 0,-8 50 0,2-2 0,1-1 0,2 0 0,4-2 0,3 0 0,3-2 0,2 1 0,2 2 0,1 0 0,1 4 0,1 2 0,-2 6 0,0 3 0,32-34 0,-8 22 0,-12 17 0,-1 2 0,-10 11 0,-6 5 0,-4 3 0,2-1 0,-6 7 0,-9 7 0,-5 5 0,-7 3 0,-3 1 0</inkml:trace>
-  <inkml:trace contextRef="#ctx0" brushRef="#br0" timeOffset="5119">11 1823 8027,'-6'-42'0,"1"0"0,6 10 0,2-8 0,3-8 0,8-26 0,7-20 0,10-14 0,-12 51 0,1 1 0,5-3 0,2 1 0,3-2 0,2 1 0,1 3 0,2 3 0,-1 4 0,2 2 0,1-1 0,1 2 0,31-31 0,-10 16 0,-6 13 0,-3 5 0,-9 9 0,1 0 0,-13 13 0,3 0 0,-8 6 0,0-1 0,-2 0 0</inkml:trace>
-  <inkml:trace contextRef="#ctx0" brushRef="#br0" timeOffset="5605">93 1695 8027,'20'-50'0,"0"1"0,6-4 0,2 0 0,4-4 0,9-9 0,11-13 0,11-9 0,-24 36 0,1 1 0,1 2 0,1 1 0,-2 6 0,1 1 0,2 0 0,0 2 0,28-17 0,6-2 0,-15 17 0,6-2 0,-10 12 0,-11 7 0,-10 9 0,-2 1 0,-6 4 0,-2 1 0,-3 4 0,-10 2 0,-2 3 0</inkml:trace>
-  <inkml:trace contextRef="#ctx0" brushRef="#br0" timeOffset="6038">283 1837 8027,'9'-49'0,"5"-2"0,3 11 0,6-7 0,5-4 0,17-28 0,8-14 0,-22 41 0,1 1 0,2-1 0,0 2 0,26-31 0,-1 12 0,-2 7 0,-5 13 0,-3 3 0,-10 14 0,-8 8 0,3-1 0,0 3 0,2-2 0</inkml:trace>
-  <inkml:trace contextRef="#ctx0" brushRef="#br0" timeOffset="6557">624 1730 8027,'9'-41'0,"3"4"0,7-11 0,4 0 0,7-7 0,6-5 0,9-12 0,3 0 0,-16 25 0,1 0 0,22-26 0,-20 29 0,1 0 0,28-28 0,-2 4 0,4 3 0,-11 12 0,-8 10 0,-6 9 0,-5 3 0,-6 8 0,1 0 0,-8 5 0,-2 5 0,-2 3 0,-3 5 0,-7 2 0,0 7 0,-6 1 0</inkml:trace>
-</inkml:ink>
-</file>
-
-<file path=ppt/ink/ink2.xml><?xml version="1.0" encoding="utf-8"?>
-<inkml:ink xmlns:inkml="http://www.w3.org/2003/InkML">
-  <inkml:definitions>
-    <inkml:context xml:id="ctx0">
-      <inkml:inkSource xml:id="inkSrc0">
-        <inkml:traceFormat>
-          <inkml:channel name="X" type="integer" min="-2.14748E9" max="2.14748E9" units="cm"/>
-          <inkml:channel name="Y" type="integer" min="-2.14748E9" max="2.14748E9" units="cm"/>
-          <inkml:channel name="F" type="integer" max="32767" units="dev"/>
-        </inkml:traceFormat>
-        <inkml:channelProperties>
-          <inkml:channelProperty channel="X" name="resolution" value="1000" units="1/cm"/>
-          <inkml:channelProperty channel="Y" name="resolution" value="1000" units="1/cm"/>
-          <inkml:channelProperty channel="F" name="resolution" value="0" units="1/dev"/>
-        </inkml:channelProperties>
-      </inkml:inkSource>
       <inkml:timestamp xml:id="ts0" timeString="2019-06-30T05:43:29.939"/>
     </inkml:context>
     <inkml:brush xml:id="br0">
@@ -176,23 +136,23 @@
       <inkml:brushProperty name="color" value="#E71224"/>
     </inkml:brush>
   </inkml:definitions>
-  <inkml:trace contextRef="#ctx0" brushRef="#br0">216 2068 8027,'0'-16'0,"1"-5"0,1 0 0,4-7 0,2-8 0,3-3 0,4-10 0,4-4 0,3-5 0,8-9 0,3-2 0,0 4 0,3 3 0,4-3 0,-3 10 0,-1 6 0,0 4 0,2-1 0,-2 7 0,-5 8 0,-1 4 0,-8 9 0,2-1 0,-4 5 0,-2 1 0,-4 3 0,-1 2 0,-5 4 0,-1 0 0,-3 4 0,-5 4 0,-3 4 0</inkml:trace>
-  <inkml:trace contextRef="#ctx0" brushRef="#br0" timeOffset="895">500 2042 8027,'-6'-35'0,"3"1"0,4 0 0,3-7 0,3-13 0,4-2 0,4-23 0,3 2 0,6-10 0,3-1 0,6 1 0,8 0 0,4 3 0,7 3 0,-5 14 0,0 8 0,-5 6 0,0 2 0,-11 13 0,4-3 0,-7 8 0,0 3 0,-4 4 0,-3 4 0,-6 7 0,1 0 0,-5 4 0,0 0 0,-1 2 0,-1 1 0,-1 1 0,-1 2 0,0-1 0,-1 4 0,-2-2 0,0 3 0,1-1 0,1 1 0</inkml:trace>
-  <inkml:trace contextRef="#ctx0" brushRef="#br0" timeOffset="1678">400 1924 8027,'-5'-23'0,"0"0"0,5 4 0,1-6 0,0-4 0,3-9 0,3-12 0,5-11 0,2-3 0,10-20 0,4 8 0,8-8 0,6 4 0,2 3 0,1 7 0,2-2 0,-7 15 0,-3 2 0,2-1 0,-7 11 0,1 3 0,-4 6 0,0 2 0,-4 7 0,1 0 0,-2 3 0,-1 4 0,-3 4 0,-1 0 0,-3 4 0,-1 1 0,-2 0 0,-3 4 0,-2 3 0,-2 0 0,0 1 0,0 0 0,0 0 0,1 1 0,0 0 0,0 1 0</inkml:trace>
-  <inkml:trace contextRef="#ctx0" brushRef="#br0" timeOffset="2455">353 1905 8027,'-9'-23'0,"2"-1"0,7 2 0,1-5 0,2-8 0,3-12 0,3-16 0,3-7 0,3-13 0,2-4 0,3-4 0,6-12 0,2 2 0,-11 42 0,1 0 0,16-34 0,-13 40 0,1 1 0,21-32 0,7-2 0,-3 12 0,2 8 0,-8 16 0,5-3 0,-8 10 0,0 1 0,-3 3 0,-8 10 0,0 1 0,-3 2 0,-2 4 0,-3 2 0,-3 4 0,-2 2 0,-2 3 0,-1 0 0,-3 2 0,-1 3 0,-2 1 0,-1 2 0,-1 4 0,-1 4 0,-7 8 0,-3 7 0</inkml:trace>
-  <inkml:trace contextRef="#ctx0" brushRef="#br0" timeOffset="3309">3 2126 8027,'-3'-42'0,"5"1"0,4 11 0,4-6 0,3-9 0,8-17 0,6-11 0,8-8 0,6 1 0,13-9 0,4 5 0,-20 36 0,0 1 0,30-25 0,-27 31 0,-1 1 0,33-25 0,-5 7 0,3 1 0,-8 9 0,0 4 0,1 0 0,-12 11 0,-7 5 0,-6 4 0,-5 5 0,-1 1 0,-7 4 0,-2 3 0,-3 1 0,-4 2 0,-5 2 0,-2 2 0,-2 1 0,-2 2 0,-4 1 0,-1 1 0</inkml:trace>
-  <inkml:trace contextRef="#ctx0" brushRef="#br0" timeOffset="4022">425 2138 8027,'18'-29'0,"0"1"0,-6 5 0,4-5 0,5-6 0,7-12 0,9-16 0,5-4 0,10-11 0,2 0 0,4-2 0,3 2 0,5 0 0,-1 7 0,-3 8 0,4 0 0,-6 11 0,-6 8 0,-3 6 0,-1 2 0,-9 9 0,-3 4 0,-8 5 0,-1 2 0,-2 1 0,-9 6 0,-1 1 0,-3 2 0,-5 1 0,0 1 0,-4 1 0,-5-1 0,-2 1 0</inkml:trace>
-  <inkml:trace contextRef="#ctx0" brushRef="#br0" timeOffset="4326">760 2015 8027,'-41'24'0,"14"-7"0,12-8 0,7-2 0,-1 1 0,0 1 0</inkml:trace>
-  <inkml:trace contextRef="#ctx0" brushRef="#br0" timeOffset="9551">560 1803 8027,'-12'-50'0,"3"2"0,9 16 0,0-3 0,0-3 0,2-9 0,3-14 0,6-5 0,6-20 0,8 0 0,5-3 0,7 0 0,4-2 0,-1 14 0,1 3 0,-3 9 0,1 2 0,0 3 0,-7 12 0,-4 8 0,-1 3 0,-3 6 0,3-1 0,-2 3 0,-3 6 0,-4 6 0,0 2 0,-4 3 0,1 1 0,-1 1 0,-1 1 0,-1 2 0,-1 0 0,-1 1 0,-1 0 0,-1 1 0,-1 1 0,0 0 0,-1 1 0,1 0 0,-3 2 0,3 2 0,-1 2 0</inkml:trace>
-  <inkml:trace contextRef="#ctx0" brushRef="#br0" timeOffset="10421">240 1892 8027,'-4'-37'0,"1"0"0,3 13 0,-1-15 0,0-12 0,2-12 0,3-17 0,8-10 0,8-16 0,7 1 0,-10 46 0,1-2 0,2 3 0,1 0 0,1-1 0,2 2 0,22-43 0,5 2 0,6 9 0,-24 40 0,1 2 0,32-37 0,-4 14 0,-2 5 0,-12 18 0,3-1 0,-12 13 0,1-1 0,-10 10 0,-2 2 0,-2 4 0,-2-1 0,-5 5 0,-5 5 0,-2 1 0,-4 3 0,-1 2 0,-4 5 0,-7 6 0,-3 4 0</inkml:trace>
-  <inkml:trace contextRef="#ctx0" brushRef="#br0" timeOffset="20383">140 1632 8027,'-17'-39'0,"4"1"0,13 5 0,0-6 0,2-5 0,7-16 0,7-10 0,8-12 0,7-10 0,10-10 0,3 4 0,-18 45 0,1 2 0,24-35 0,3 2 0,1 7 0,3 2 0,-6 13 0,-6 8 0,-4 7 0,-5 7 0,0 0 0,-6 8 0,-6 7 0,-3 4 0,-4 5 0,-1 2 0,-4 3 0,-5 4 0,-3 2 0,1 3 0,-2 1 0,0 3 0,1 0 0</inkml:trace>
-  <inkml:trace contextRef="#ctx0" brushRef="#br0" timeOffset="21422">42 1585 8027,'16'-47'0,"-1"7"0,1 4 0,5 1 0,4-2 0,5-4 0,11-11 0,7-8 0,20-16 0,-30 35 0,2 0 0,2-2 0,1 0 0,0 3 0,0 1 0,1 0 0,0 2 0,39-32 0,-38 33 0,1 1 0,39-24 0,-9 7 0,-1 4 0,-19 15 0,-1 2 0,-4 2 0,-4 5 0,-9 4 0,-6 5 0,-3 3 0,-6 2 0,-5 3 0,-4 1 0,-6 4 0,-4 1 0,-10 9 0,-4 4 0</inkml:trace>
-  <inkml:trace contextRef="#ctx0" brushRef="#br0" timeOffset="22468">743 1648 8027,'3'14'0,"-1"-1"0,8 2 0,1 1 0</inkml:trace>
-  <inkml:trace contextRef="#ctx0" brushRef="#br0" timeOffset="22908">971 1822 8027,'19'-67'0,"-1"7"0,-14 31 0,3-5 0,4-8 0,7-16 0,6-12 0,4-7 0,4 1 0,6-4 0,3-2 0,1-2 0,3-1 0,-6 11 0,0 3 0,-4 7 0,-1 2 0,-5 10 0,-9 18 0,-2 1 0,1 0 0,-5 9 0,-2 3 0,-3 5 0,-3 5 0,0 5 0,-5 8 0,2 3 0,-6 7 0,1 0 0</inkml:trace>
+  <inkml:trace contextRef="#ctx0" brushRef="#br0">262 2632 8027,'0'-20'0,"1"-7"0,1 0 0,5-8 0,3-11 0,3-4 0,6-12 0,4-5 0,3-7 0,11-12 0,3-1 0,0 4 0,3 4 0,6-4 0,-5 13 0,0 8 0,0 5 0,2-2 0,-3 9 0,-5 11 0,-2 5 0,-9 11 0,2-2 0,-5 8 0,-2 0 0,-5 4 0,-2 3 0,-5 5 0,-1 0 0,-5 5 0,-5 5 0,-4 5 0</inkml:trace>
+  <inkml:trace contextRef="#ctx0" brushRef="#br0" timeOffset="895">605 2599 8027,'-7'-44'0,"4"0"0,4 1 0,4-9 0,3-17 0,5-2 0,6-30 0,2 3 0,8-12 0,4-2 0,7 1 0,10 0 0,4 4 0,9 4 0,-6 18 0,0 10 0,-6 7 0,0 3 0,-14 17 0,6-4 0,-9 10 0,-1 4 0,-3 4 0,-5 6 0,-7 9 0,2 0 0,-7 5 0,0 0 0,-1 3 0,-1 1 0,-1 1 0,-2 2 0,1 0 0,-2 4 0,-2-2 0,0 4 0,1-2 0,1 2 0</inkml:trace>
+  <inkml:trace contextRef="#ctx0" brushRef="#br0" timeOffset="1678">484 2449 8027,'-6'-29'0,"0"-1"0,6 6 0,1-8 0,1-4 0,3-13 0,3-14 0,7-15 0,1-4 0,14-25 0,3 11 0,11-11 0,7 5 0,2 4 0,2 9 0,2-3 0,-9 20 0,-3 2 0,2-2 0,-8 15 0,1 4 0,-5 7 0,0 3 0,-5 8 0,2 1 0,-3 3 0,-1 6 0,-4 4 0,-1 1 0,-4 5 0,-1 1 0,-2 0 0,-4 5 0,-2 4 0,-3 0 0,1 1 0,-1 0 0,0 0 0,2 2 0,-1-1 0,0 2 0</inkml:trace>
+  <inkml:trace contextRef="#ctx0" brushRef="#br0" timeOffset="2455">427 2425 8027,'-10'-29'0,"1"-2"0,9 3 0,1-6 0,3-11 0,3-15 0,4-20 0,4-9 0,3-17 0,2-4 0,5-6 0,6-15 0,3 2 0,-13 54 0,0 0 0,21-44 0,-17 52 0,2 1 0,25-41 0,8-3 0,-3 16 0,2 10 0,-9 21 0,6-5 0,-10 13 0,0 2 0,-4 3 0,-9 13 0,0 2 0,-4 2 0,-3 5 0,-3 2 0,-3 6 0,-3 2 0,-3 4 0,0 0 0,-5 3 0,0 3 0,-3 2 0,-1 2 0,-2 5 0,0 5 0,-9 11 0,-4 8 0</inkml:trace>
+  <inkml:trace contextRef="#ctx0" brushRef="#br0" timeOffset="3309">4 2706 8027,'-4'-53'0,"6"0"0,6 15 0,4-8 0,4-11 0,9-22 0,8-14 0,9-10 0,8 1 0,15-11 0,5 6 0,-24 46 0,0 1 0,37-31 0,-34 38 0,0 3 0,39-33 0,-5 9 0,2 1 0,-8 12 0,-1 5 0,2 0 0,-15 14 0,-9 7 0,-7 4 0,-6 7 0,-1 1 0,-8 5 0,-3 4 0,-4 1 0,-4 3 0,-7 3 0,-1 2 0,-4 1 0,-1 2 0,-6 2 0,-1 2 0</inkml:trace>
+  <inkml:trace contextRef="#ctx0" brushRef="#br0" timeOffset="4022">515 2721 8027,'21'-37'0,"1"2"0,-7 6 0,4-7 0,7-7 0,7-16 0,12-20 0,6-5 0,12-14 0,3 0 0,4-2 0,4 2 0,6 0 0,-2 8 0,-3 12 0,5-1 0,-7 14 0,-8 10 0,-3 8 0,-1 2 0,-12 12 0,-3 5 0,-9 7 0,-2 1 0,-3 3 0,-10 6 0,-1 3 0,-4 1 0,-6 2 0,0 1 0,-5 2 0,-6-2 0,-3 1 0</inkml:trace>
+  <inkml:trace contextRef="#ctx0" brushRef="#br0" timeOffset="4326">920 2565 8027,'-49'30'0,"16"-8"0,15-11 0,8-2 0,-1 2 0,0 0 0</inkml:trace>
+  <inkml:trace contextRef="#ctx0" brushRef="#br0" timeOffset="9551">678 2295 8027,'-14'-64'0,"3"3"0,11 21 0,0-5 0,0-3 0,2-12 0,4-18 0,7-6 0,8-25 0,9-1 0,7-3 0,7 0 0,6-3 0,-1 18 0,0 4 0,-3 11 0,1 3 0,1 3 0,-10 16 0,-4 10 0,-1 4 0,-4 8 0,4-2 0,-3 4 0,-3 8 0,-5 7 0,-1 3 0,-4 4 0,1 1 0,-1 1 0,-1 2 0,-1 2 0,-2 0 0,-1 1 0,-1 0 0,-1 2 0,-2 1 0,1 0 0,-2 1 0,1 0 0,-3 3 0,4 2 0,-2 3 0</inkml:trace>
+  <inkml:trace contextRef="#ctx0" brushRef="#br0" timeOffset="10421">291 2408 8027,'-5'-47'0,"1"0"0,4 17 0,-1-20 0,0-15 0,2-15 0,4-22 0,9-13 0,11-20 0,7 2 0,-11 58 0,1-3 0,2 4 0,1 0 0,2-1 0,2 3 0,27-56 0,5 4 0,8 10 0,-29 52 0,2 2 0,37-47 0,-3 18 0,-4 6 0,-14 24 0,4-2 0,-15 16 0,2-1 0,-13 13 0,-2 3 0,-3 4 0,-1-1 0,-7 7 0,-6 6 0,-3 1 0,-4 4 0,-2 3 0,-4 6 0,-9 8 0,-3 4 0</inkml:trace>
+  <inkml:trace contextRef="#ctx0" brushRef="#br0" timeOffset="20383">170 2077 8027,'-21'-49'0,"5"0"0,16 7 0,0-7 0,3-7 0,8-21 0,8-12 0,10-15 0,8-13 0,13-13 0,3 5 0,-21 58 0,1 2 0,28-45 0,5 3 0,0 9 0,5 3 0,-8 16 0,-8 10 0,-4 9 0,-6 9 0,0 1 0,-8 9 0,-6 9 0,-5 5 0,-4 7 0,-1 2 0,-6 4 0,-5 5 0,-4 3 0,1 3 0,-2 2 0,0 4 0,1-1 0</inkml:trace>
+  <inkml:trace contextRef="#ctx0" brushRef="#br0" timeOffset="21422">51 2017 8027,'19'-59'0,"-1"8"0,2 5 0,5 1 0,5-2 0,7-5 0,12-14 0,10-10 0,23-21 0,-36 45 0,2-1 0,3-1 0,1-1 0,0 4 0,0 1 0,2 1 0,-1 2 0,48-41 0,-47 42 0,2 1 0,47-30 0,-11 9 0,-2 5 0,-22 19 0,-1 3 0,-5 2 0,-5 6 0,-11 6 0,-8 6 0,-3 3 0,-7 4 0,-6 3 0,-5 1 0,-7 6 0,-5 0 0,-13 12 0,-4 6 0</inkml:trace>
+  <inkml:trace contextRef="#ctx0" brushRef="#br0" timeOffset="22468">900 2098 8027,'3'17'0,"0"0"0,9 2 0,1 2 0</inkml:trace>
+  <inkml:trace contextRef="#ctx0" brushRef="#br0" timeOffset="22908">1176 2319 8027,'23'-85'0,"-1"9"0,-18 39 0,5-7 0,4-9 0,9-21 0,7-15 0,5-9 0,5 1 0,7-5 0,3-2 0,2-3 0,4-1 0,-8 14 0,0 3 0,-4 10 0,-2 2 0,-6 13 0,-11 22 0,-2 2 0,1 0 0,-6 12 0,-3 3 0,-3 7 0,-3 6 0,-1 6 0,-6 11 0,3 3 0,-8 9 0,2 1 0</inkml:trace>
 </inkml:ink>
 </file>
 
-<file path=ppt/ink/ink3.xml><?xml version="1.0" encoding="utf-8"?>
+<file path=ppt/ink/ink2.xml><?xml version="1.0" encoding="utf-8"?>
 <inkml:ink xmlns:inkml="http://www.w3.org/2003/InkML">
   <inkml:definitions>
     <inkml:context xml:id="ctx0">
@@ -216,18 +176,67 @@
       <inkml:brushProperty name="color" value="#00A0D7"/>
     </inkml:brush>
   </inkml:definitions>
-  <inkml:trace contextRef="#ctx0" brushRef="#br0">95 1967 8027,'-9'-20'0,"2"-4"0,8 0 0,3-7 0,3-7 0,5-14 0,6-16 0,4-3 0,8-12 0,3 9 0,2 5 0,6-4 0,0 8 0,-4 8 0,1 2 0,-3 8 0,1-3 0,-3 6 0,-2 5 0,-2 5 0,-2 2 0,0 4 0,-4 5 0,0 3 0,-2 1 0,0 1 0,-1 0 0,-4 4 0,-1 2 0,-1 1 0,-4 3 0,-3 2 0,-1 2 0,-2 0 0,2 2 0,0 0 0,0 0 0,3 0 0,-1 1 0</inkml:trace>
-  <inkml:trace contextRef="#ctx0" brushRef="#br0" timeOffset="641">327 1935 8027,'11'-18'0,"-1"-3"0,3-13 0,4-7 0,6-17 0,5-7 0,5-8 0,4-4 0,7-4 0,6-5 0,7-1 0,6-2 0,2 4 0,-1 7 0,-6 11 0,-7 10 0,-10 12 0,-6 8 0,2-4 0,-11 13 0,1 1 0,-6 6 0,0 2 0,-4 4 0,-7 6 0,-1 2 0,-3 3 0,-1 3 0,-1 1 0,-2 7 0,-2 3 0</inkml:trace>
-  <inkml:trace contextRef="#ctx0" brushRef="#br0" timeOffset="1272">402 1958 8027,'0'-42'0,"3"4"0,2 1 0,4-4 0,3-4 0,3-5 0,5-16 0,4-11 0,8-9 0,5-7 0,6 0 0,6-2 0,4 8 0,0 9 0,5 1 0,-6 12 0,-6 13 0,-5 8 0,-2 3 0,-5 8 0,-4 3 0,-2 1 0,-9 10 0,-3 4 0,-2 2 0,-5 3 0,-2 5 0,-3 2 0,1 5 0,-3 2 0</inkml:trace>
-  <inkml:trace contextRef="#ctx0" brushRef="#br0" timeOffset="1920">413 1879 8027,'-13'-31'0,"3"-2"0,10 4 0,4-14 0,2-10 0,7-14 0,5-12 0,7-7 0,6-6 0,5-2 0,9-2 0,4 5 0,6 3 0,-7 20 0,-2 11 0,-3 5 0,-4 8 0,-1 1 0,1 4 0,-9 11 0,-2 4 0,-4 5 0,-2 3 0,-5 6 0,-1 0 0,-2 2 0,-3 3 0,-3 1 0,-1 3 0,-1-1 0,-2 2 0,0 0 0,-1 0 0</inkml:trace>
-  <inkml:trace contextRef="#ctx0" brushRef="#br0" timeOffset="2623">392 1965 8027,'-12'-26'0,"1"-7"0,11 3 0,1-13 0,1-13 0,7-10 0,7-16 0,6-7 0,8-5 0,5-3 0,6 0 0,5-1 0,3 6 0,5 3 0,-7 20 0,-5 12 0,2 2 0,-1 4 0,2 2 0,-2 5 0,-8 11 0,-5 7 0,-5 6 0,-1 2 0,3-1 0,-5 6 0,1 0 0,-5 4 0,-1 1 0,-2 2 0,0-1 0,-2 1 0,0 0 0,-1 0 0,-3 1 0,0 1 0,-4 2 0,0 3 0,-6 5 0,-2 5 0</inkml:trace>
-  <inkml:trace contextRef="#ctx0" brushRef="#br0" timeOffset="5550">202 1800 8027,'1'-40'0,"0"4"0,4 1 0,3-1 0,3-8 0,3-3 0,6-16 0,7-9 0,6-10 0,6-9 0,-14 39 0,1-2 0,1-2 0,2 0 0,-2 5 0,0 2 0,25-40 0,-1 10 0,2 1 0,1 5 0,-12 20 0,4-2 0,-12 14 0,-1 2 0,-8 12 0,1-1 0,-5 8 0,0 0 0,-4 5 0,-4 4 0,-2 4 0,-4 4 0,0 1 0,-2 3 0,0 0 0</inkml:trace>
-  <inkml:trace contextRef="#ctx0" brushRef="#br0" timeOffset="6293">2 1659 8027,'-1'-46'0,"0"-1"0,3-3 0,2 1 0,3-5 0,6-2 0,2-4 0,7-16 0,6-10 0,8-17 0,3 0 0,-14 44 0,2 0 0,21-31 0,-19 39 0,1 0 0,27-31 0,5-2 0,4 2 0,-9 15 0,-2 6 0,-12 17 0,3 2 0,-6 7 0,-2 2 0,-10 13 0,3-3 0,-11 9 0,3 0 0,-6 4 0,-4 6 0,-4 1 0,-4 5 0,-2 1 0</inkml:trace>
-  <inkml:trace contextRef="#ctx0" brushRef="#br0" timeOffset="8723">854 1617 8027,'-22'-61'0,"3"10"0,0-2 0,4 4 0,4 2 0,1 0 0,3-2 0,2-3 0,1-7 0,1-6 0,3-11 0,4 0 0,4 0 0,7 3 0,7 1 0,3 8 0,1 8 0,3-2 0,-2 10 0,1 1 0,-2 8 0,1 1 0,-5 8 0,-3 6 0,-2 2 0,-1 2 0,-1 1 0,-1 2 0,-1 0 0,-4 6 0,-2 0 0,0 2 0,-3 3 0,3 1 0,-4 6 0,1 1 0</inkml:trace>
-  <inkml:trace contextRef="#ctx0" brushRef="#br0" timeOffset="9707">666 2000 8027,'21'-45'0,"1"6"0,0-10 0,4 4 0,4 0 0,2-1 0,3 1 0,10-12 0,7-3 0,6-5 0,6 0 0,-7 11 0,2 3 0,-5 6 0,1 0 0,-3 3 0,-13 13 0,3-3 0,-7 7 0,-6 5 0,-4 3 0,-5 4 0,-1 0 0,-3 4 0,-5 1 0,-1 5 0,-4 2 0,1 1 0</inkml:trace>
-  <inkml:trace contextRef="#ctx0" brushRef="#br0" timeOffset="10770">947 1898 8027,'0'-49'0,"0"3"0,7 1 0,4-3 0,4-1 0,2-3 0,3-5 0,4-13 0,-1 9 0,7-17 0,-2 8 0,4-2 0,-1 5 0,-3 9 0,-1 0 0,-4 9 0,-3 8 0,-1 2 0,-2 7 0,-1 2 0,0 2 0,-5 9 0,0 2 0,-2 3 0,-2 5 0,-1 3 0,0 3 0,0 2 0</inkml:trace>
-  <inkml:trace contextRef="#ctx0" brushRef="#br0" timeOffset="12003">125 1763 8027,'2'-55'0,"0"3"0,0 14 0,4-3 0,2-4 0,3-15 0,3-8 0,4-10 0,6-7 0,4-6 0,7-2 0,4-1 0,5 1 0,-4 15 0,3 6 0,-7 16 0,2-1 0,-7 16 0,-2 3 0,-5 7 0,0 2 0,-6 8 0,-3 2 0,-2 6 0,-4 3 0,-1 3 0,0 0 0,2 0 0</inkml:trace>
-  <inkml:trace contextRef="#ctx0" brushRef="#br0" timeOffset="13185">613 1805 8027,'2'-35'0,"4"-6"0,5-3 0,8-4 0,4-2 0,4-2 0,2-2 0,11-11 0,8-6 0,8-5 0,5 0 0,0 5 0,-3 11 0,1 2 0,-11 16 0,6-5 0,-7 10 0,-7 5 0,-4 5 0,-10 7 0,-1 1 0,-2 3 0,-6 3 0,-2 0 0,-3 3 0</inkml:trace>
+  <inkml:trace contextRef="#ctx0" brushRef="#br0">115 2503 8027,'-11'-25'0,"3"-6"0,9 1 0,4-10 0,3-8 0,7-18 0,7-21 0,4-3 0,10-16 0,4 12 0,3 6 0,6-5 0,1 11 0,-5 9 0,1 3 0,-4 10 0,2-3 0,-4 7 0,-3 6 0,-1 7 0,-4 2 0,1 5 0,-5 7 0,0 4 0,-3 0 0,0 2 0,0 1 0,-6 4 0,-1 2 0,-1 2 0,-5 4 0,-3 3 0,-2 2 0,-2-1 0,2 4 0,0-1 0,1 1 0,3-1 0,-2 2 0</inkml:trace>
+  <inkml:trace contextRef="#ctx0" brushRef="#br0" timeOffset="641">396 2463 8027,'13'-23'0,"-1"-4"0,4-16 0,5-9 0,7-22 0,5-9 0,7-10 0,5-5 0,9-5 0,6-6 0,9-2 0,7-2 0,3 4 0,-1 10 0,-8 14 0,-8 12 0,-13 16 0,-6 10 0,1-5 0,-12 16 0,1 2 0,-8 7 0,0 3 0,-4 5 0,-9 7 0,-1 3 0,-4 4 0,-1 4 0,-1 1 0,-2 9 0,-3 4 0</inkml:trace>
+  <inkml:trace contextRef="#ctx0" brushRef="#br0" timeOffset="1272">487 2492 8027,'0'-53'0,"3"4"0,3 2 0,5-5 0,4-5 0,3-7 0,6-20 0,5-14 0,10-12 0,6-8 0,7 0 0,7-3 0,5 10 0,1 12 0,5 1 0,-7 15 0,-7 17 0,-7 10 0,-2 4 0,-5 10 0,-6 3 0,-2 3 0,-11 11 0,-4 6 0,-2 3 0,-6 3 0,-2 7 0,-5 2 0,2 6 0,-3 3 0</inkml:trace>
+  <inkml:trace contextRef="#ctx0" brushRef="#br0" timeOffset="1920">500 2391 8027,'-16'-39'0,"4"-3"0,12 5 0,5-18 0,2-12 0,9-18 0,6-16 0,8-8 0,8-9 0,5-1 0,12-3 0,4 6 0,8 4 0,-9 25 0,-2 15 0,-4 5 0,-5 11 0,-1 2 0,1 4 0,-11 14 0,-2 6 0,-5 6 0,-2 3 0,-6 9 0,-2-1 0,-2 3 0,-4 3 0,-3 2 0,-2 4 0,0-2 0,-3 3 0,-1 0 0,0 0 0</inkml:trace>
+  <inkml:trace contextRef="#ctx0" brushRef="#br0" timeOffset="2623">475 2501 8027,'-15'-33'0,"2"-9"0,13 4 0,1-17 0,1-16 0,9-13 0,9-21 0,6-8 0,11-7 0,5-3 0,8-1 0,5 0 0,5 7 0,5 3 0,-8 26 0,-6 16 0,2 2 0,-1 5 0,3 3 0,-3 6 0,-10 14 0,-5 8 0,-7 9 0,-1 2 0,4-1 0,-7 7 0,2 1 0,-6 4 0,-2 2 0,-1 3 0,-1-2 0,-2 1 0,-1 0 0,0 1 0,-4 0 0,0 2 0,-5 3 0,0 3 0,-7 7 0,-3 6 0</inkml:trace>
+  <inkml:trace contextRef="#ctx0" brushRef="#br0" timeOffset="5550">245 2291 8027,'1'-51'0,"0"5"0,5 2 0,4-2 0,3-10 0,4-4 0,7-20 0,9-12 0,7-12 0,7-12 0,-17 50 0,2-3 0,1-2 0,2-1 0,-3 7 0,1 3 0,30-51 0,-1 12 0,2 2 0,1 6 0,-14 26 0,5-3 0,-15 17 0,-1 4 0,-10 14 0,2 0 0,-7 9 0,1 1 0,-6 6 0,-4 5 0,-3 5 0,-4 5 0,-1 1 0,-2 5 0,0-1 0</inkml:trace>
+  <inkml:trace contextRef="#ctx0" brushRef="#br0" timeOffset="6293">2 2111 8027,'-1'-58'0,"0"-2"0,3-4 0,3 2 0,4-7 0,6-2 0,4-5 0,7-21 0,8-13 0,10-21 0,3 0 0,-17 56 0,3 0 0,25-40 0,-23 51 0,2-1 0,32-40 0,6-2 0,5 3 0,-11 19 0,-3 7 0,-14 22 0,4 3 0,-8 8 0,-2 3 0,-12 17 0,4-5 0,-14 12 0,4 1 0,-7 4 0,-6 8 0,-4 1 0,-5 7 0,-2 0 0</inkml:trace>
+  <inkml:trace contextRef="#ctx0" brushRef="#br0" timeOffset="8723">1034 2058 8027,'-27'-78'0,"4"13"0,0-2 0,5 5 0,5 2 0,1 0 0,3-2 0,3-5 0,2-8 0,0-7 0,4-15 0,5 0 0,4 0 0,10 4 0,7 2 0,4 9 0,2 11 0,3-3 0,-2 13 0,1 1 0,-3 11 0,2 0 0,-6 11 0,-4 7 0,-3 3 0,-1 3 0,0 1 0,-2 2 0,-2 1 0,-4 7 0,-2 0 0,-1 2 0,-3 4 0,4 2 0,-6 7 0,2 2 0</inkml:trace>
+  <inkml:trace contextRef="#ctx0" brushRef="#br0" timeOffset="9707">806 2545 8027,'26'-57'0,"1"8"0,-1-14 0,6 6 0,4 0 0,3-2 0,3 2 0,13-16 0,8-3 0,7-7 0,7 0 0,-8 15 0,3 3 0,-7 7 0,2 1 0,-4 4 0,-16 16 0,4-4 0,-9 9 0,-7 7 0,-4 3 0,-7 6 0,-1-1 0,-4 6 0,-5 0 0,-2 8 0,-5 1 0,1 2 0</inkml:trace>
+  <inkml:trace contextRef="#ctx0" brushRef="#br0" timeOffset="10770">1147 2416 8027,'0'-63'0,"0"5"0,8 0 0,6-3 0,4-1 0,2-4 0,5-7 0,4-16 0,-2 11 0,10-21 0,-3 10 0,4-3 0,0 7 0,-4 11 0,-1 1 0,-6 10 0,-2 11 0,-2 2 0,-3 10 0,0 1 0,-1 4 0,-6 11 0,1 2 0,-3 4 0,-3 7 0,-1 3 0,1 4 0,-1 3 0</inkml:trace>
+  <inkml:trace contextRef="#ctx0" brushRef="#br0" timeOffset="12003">151 2244 8027,'3'-70'0,"-1"4"0,1 17 0,4-3 0,3-5 0,3-20 0,4-9 0,5-13 0,7-10 0,5-6 0,8-4 0,5-1 0,7 2 0,-6 19 0,4 7 0,-8 21 0,2-2 0,-9 21 0,-2 4 0,-6 8 0,0 3 0,-7 11 0,-4 2 0,-2 7 0,-5 4 0,-1 4 0,-1 0 0,3 1 0</inkml:trace>
+  <inkml:trace contextRef="#ctx0" brushRef="#br0" timeOffset="13185">742 2297 8027,'3'-44'0,"4"-8"0,6-4 0,10-6 0,5-1 0,5-3 0,2-3 0,13-14 0,11-7 0,8-7 0,7 0 0,0 7 0,-4 14 0,2 2 0,-14 20 0,7-6 0,-8 13 0,-8 7 0,-6 5 0,-11 10 0,-2 1 0,-2 3 0,-8 5 0,-1-1 0,-5 4 0</inkml:trace>
+</inkml:ink>
+</file>
+
+<file path=ppt/ink/ink3.xml><?xml version="1.0" encoding="utf-8"?>
+<inkml:ink xmlns:inkml="http://www.w3.org/2003/InkML">
+  <inkml:definitions>
+    <inkml:context xml:id="ctx0">
+      <inkml:inkSource xml:id="inkSrc0">
+        <inkml:traceFormat>
+          <inkml:channel name="X" type="integer" min="-2.14748E9" max="2.14748E9" units="cm"/>
+          <inkml:channel name="Y" type="integer" min="-2.14748E9" max="2.14748E9" units="cm"/>
+          <inkml:channel name="F" type="integer" max="32767" units="dev"/>
+        </inkml:traceFormat>
+        <inkml:channelProperties>
+          <inkml:channelProperty channel="X" name="resolution" value="1000" units="1/cm"/>
+          <inkml:channelProperty channel="Y" name="resolution" value="1000" units="1/cm"/>
+          <inkml:channelProperty channel="F" name="resolution" value="0" units="1/dev"/>
+        </inkml:channelProperties>
+      </inkml:inkSource>
+      <inkml:timestamp xml:id="ts0" timeString="2019-06-30T19:59:14.594"/>
+    </inkml:context>
+    <inkml:brush xml:id="br0">
+      <inkml:brushProperty name="width" value="0.07056" units="cm"/>
+      <inkml:brushProperty name="height" value="0.07056" units="cm"/>
+      <inkml:brushProperty name="color" value="#E71224"/>
+    </inkml:brush>
+    <inkml:brush xml:id="br1">
+      <inkml:brushProperty name="width" value="0.07056" units="cm"/>
+      <inkml:brushProperty name="height" value="0.07056" units="cm"/>
+      <inkml:brushProperty name="color" value="#66CC00"/>
+    </inkml:brush>
+    <inkml:brush xml:id="br2">
+      <inkml:brushProperty name="width" value="0.07056" units="cm"/>
+      <inkml:brushProperty name="height" value="0.07056" units="cm"/>
+      <inkml:brushProperty name="color" value="#00A0D7"/>
+    </inkml:brush>
+  </inkml:definitions>
+  <inkml:trace contextRef="#ctx0" brushRef="#br0">178 1695 8027,'1'-30'0,"-1"0"0,4-2 0,3-4 0,5-10 0,4-15 0,6-9 0,6-21 0,5-2 0,5-3 0,4-2 0,6-2 0,3 2 0,6 2 0,-6 16 0,3 5 0,-9 19 0,5-4 0,-10 18 0,2 0 0,-7 7 0,0 3 0,-8 7 0,-1 4 0,-9 7 0,-1 1 0,-3 3 0,-1 0 0,-2 2 0</inkml:trace>
+  <inkml:trace contextRef="#ctx0" brushRef="#br0" timeOffset="831">478 1829 8027,'-7'-78'0,"3"18"0,3 15 0,1 3 0,2-10 0,4-17 0,4-6 0,4-9 0,2-1 0,1-2 0,9-19 0,0 10 0,6-9 0,1 6 0,3 0 0,3-1 0,-1 6 0,-1 10 0,-7 15 0,-5 13 0,-2 5 0,-4 12 0,1-2 0,-3 10 0,-2 2 0,-3 7 0,-3 8 0,-3 4 0,-1 6 0,-2 2 0,1 2 0</inkml:trace>
+  <inkml:trace contextRef="#ctx0" brushRef="#br0" timeOffset="1774">156 1419 8027,'1'-29'0,"4"3"0,4 6 0,5 0 0,5-2 0,4-1 0,7-4 0,7-6 0,8-5 0,8-7 0,9-6 0,2-1 0,8-8 0,-1 3 0,-5 3 0,5-5 0,-5 7 0,0 0 0,-6 7 0,-1 4 0,-16 13 0,-2 2 0,-10 7 0,0 1 0,-6 3 0,-1 0 0,-5 4 0,-7 4 0,-3 2 0,-3 2 0,-1-1 0,0 0 0</inkml:trace>
+  <inkml:trace contextRef="#ctx0" brushRef="#br0" timeOffset="2446">766 1616 8027,'-6'-26'0,"2"-1"0,4 5 0,0-6 0,2-6 0,2-5 0,5-9 0,4-13 0,6-20 0,4-1 0,5-15 0,2 2 0,3-2 0,4 0 0,4-1 0,-6 18 0,-1 10 0,-1 0 0,2 5 0,-6 10 0,0 6 0,-1 3 0,-6 13 0,-2 4 0,-5 7 0,1 0 0,-3 5 0,1 5 0,-2 1 0</inkml:trace>
+  <inkml:trace contextRef="#ctx0" brushRef="#br1" timeOffset="19371">693 1844 8027,'8'-68'0,"3"8"0,0 1 0,2 4 0,4-3 0,0 2 0,2 0 0,2-2 0,3-5 0,4-4 0,8-8 0,-4 12 0,3 6 0,-7 15 0,2-1 0,-1 7 0,1 0 0,-6 9 0,-3 7 0,-4 4 0,0 1 0,-5 4 0,-2 6 0,-2 4 0,-1 2 0</inkml:trace>
+  <inkml:trace contextRef="#ctx0" brushRef="#br1" timeOffset="20306">311 2036 8027,'-3'-30'0,"4"1"0,4 6 0,6-3 0,4-2 0,6-5 0,5-5 0,13-14 0,10-9 0,4 2 0,9-1 0,-8 13 0,14-9 0,4 1 0,1 3 0,7-2 0,-15 13 0,-5 5 0,0 2 0,-8 6 0,-1 4 0,-3 2 0,-13 9 0,-3 2 0,-4 1 0,-2 1 0,-4 4 0,-3 0 0,-1 3 0</inkml:trace>
+  <inkml:trace contextRef="#ctx0" brushRef="#br1" timeOffset="21082">396 1933 8027,'-16'-28'0,"7"0"0,5 0 0,3-3 0,1-7 0,0-8 0,3-11 0,2-10 0,5-7 0,3-5 0,5-1 0,1-4 0,2 1 0,1 2 0,3 2 0,2 3 0,-3 14 0,1 4 0,-4 15 0,0-2 0,-5 13 0,1 1 0,-4 6 0,0 2 0,-3 6 0,-2 7 0,-2 3 0,-1 3 0,0 1 0</inkml:trace>
+  <inkml:trace contextRef="#ctx0" brushRef="#br1" timeOffset="22265">886 1999 8027,'-20'-39'0,"9"7"0,7 2 0,4 1 0,1-5 0,2-6 0,2-9 0,3-12 0,5-12 0,3 0 0,6-16 0,-2 16 0,6-12 0,-2 13 0,-2 7 0,1 2 0,-5 15 0,3 1 0,-2 10 0,0 3 0,3 1 0,-4 9 0</inkml:trace>
+  <inkml:trace contextRef="#ctx0" brushRef="#br2" timeOffset="31141">338 1254 8027,'8'-36'0,"4"4"0,-2-7 0,4-1 0,4-4 0,2-4 0,2-3 0,4-8 0,7-13 0,1-2 0,8-19 0,-5 15 0,-1 3 0,-2 4 0,3-6 0,-5 15 0,-2 6 0,-5 15 0,1 0 0,-6 13 0,1 0 0,-3 8 0,0 1 0,-2 5 0,-5 6 0,-2 4 0,-4 8 0,-2 4 0</inkml:trace>
+  <inkml:trace contextRef="#ctx0" brushRef="#br2" timeOffset="32020">653 1600 8027,'-19'-36'0,"7"6"0,7 3 0,4 0 0,1-15 0,0-9 0,2-13 0,3-7 0,4-3 0,6-10 0,3 9 0,4-6 0,3-4 0,3 4 0,3 1 0,-3 14 0,1 7 0,-6 12 0,1 0 0,-6 12 0,0 0 0,-2 7 0,-1 2 0,-4 5 0,-2 7 0,-3 4 0,0 5 0,-2 7 0,1 2 0</inkml:trace>
+  <inkml:trace contextRef="#ctx0" brushRef="#br2" timeOffset="32971">1 938 8027,'17'-31'0,"4"-2"0,4 6 0,5-3 0,10-4 0,7-3 0,13-6 0,4 1 0,3 3 0,1 3 0,1 4 0,-10 7 0,1 3 0,-6 2 0,5-2 0,-12 4 0,-4 2 0,-12 4 0,-1-1 0,-4 3 0,-1 0 0,-5 2 0,-5 1 0,-4 3 0,-4 0 0,1 0 0,-2 0 0</inkml:trace>
+  <inkml:trace contextRef="#ctx0" brushRef="#br2" timeOffset="37694">1170 1892 8027,'-5'-30'0,"2"6"0,1 2 0,2 3 0,0-4 0,0-1 0,0-10 0,0-5 0,1-13 0,0-5 0,1-5 0,3 0 0,2-4 0,1-5 0,2-3 0,3-2 0,1 0 0,2 1 0,-1 13 0,0 6 0,-2 8 0,2-3 0,-2 10 0,1 0 0,-3 10 0,-1 6 0,-1 2 0,-1 3 0,0 3 0,-3 4 0,0 4 0,-1 1 0,0 3 0,0 2 0,1-1 0,0-1 0</inkml:trace>
 </inkml:ink>
 </file>
 
@@ -3094,264 +3103,6 @@
       </p:grpSpPr>
       <p:grpSp>
         <p:nvGrpSpPr>
-          <p:cNvPr id="103" name="Group 102">
-            <a:extLst>
-              <a:ext uri="{FF2B5EF4-FFF2-40B4-BE49-F238E27FC236}">
-                <a16:creationId xmlns:a16="http://schemas.microsoft.com/office/drawing/2014/main" id="{380C5A7D-FAC7-1A47-BCA4-DC5E3313186F}"/>
-              </a:ext>
-            </a:extLst>
-          </p:cNvPr>
-          <p:cNvGrpSpPr/>
-          <p:nvPr/>
-        </p:nvGrpSpPr>
-        <p:grpSpPr>
-          <a:xfrm>
-            <a:off x="477366" y="7505217"/>
-            <a:ext cx="755120" cy="1436760"/>
-            <a:chOff x="952047" y="1241937"/>
-            <a:chExt cx="671218" cy="1277120"/>
-          </a:xfrm>
-        </p:grpSpPr>
-        <p:grpSp>
-          <p:nvGrpSpPr>
-            <p:cNvPr id="38" name="Group 37">
-              <a:extLst>
-                <a:ext uri="{FF2B5EF4-FFF2-40B4-BE49-F238E27FC236}">
-                  <a16:creationId xmlns:a16="http://schemas.microsoft.com/office/drawing/2014/main" id="{9456CC99-059C-084F-BA09-DEEE6C2E0972}"/>
-                </a:ext>
-              </a:extLst>
-            </p:cNvPr>
-            <p:cNvGrpSpPr/>
-            <p:nvPr/>
-          </p:nvGrpSpPr>
-          <p:grpSpPr>
-            <a:xfrm>
-              <a:off x="952047" y="1241937"/>
-              <a:ext cx="671218" cy="1277120"/>
-              <a:chOff x="2307772" y="1328057"/>
-              <a:chExt cx="671218" cy="1277120"/>
-            </a:xfrm>
-          </p:grpSpPr>
-          <p:sp>
-            <p:nvSpPr>
-              <p:cNvPr id="19" name="Rounded Rectangle 18">
-                <a:extLst>
-                  <a:ext uri="{FF2B5EF4-FFF2-40B4-BE49-F238E27FC236}">
-                    <a16:creationId xmlns:a16="http://schemas.microsoft.com/office/drawing/2014/main" id="{908863B3-71E1-9549-BCB3-85B7EA66232B}"/>
-                  </a:ext>
-                </a:extLst>
-              </p:cNvPr>
-              <p:cNvSpPr/>
-              <p:nvPr/>
-            </p:nvSpPr>
-            <p:spPr>
-              <a:xfrm>
-                <a:off x="2307772" y="1328057"/>
-                <a:ext cx="671218" cy="1277120"/>
-              </a:xfrm>
-              <a:prstGeom prst="roundRect">
-                <a:avLst/>
-              </a:prstGeom>
-              <a:ln>
-                <a:solidFill>
-                  <a:schemeClr val="tx1"/>
-                </a:solidFill>
-              </a:ln>
-            </p:spPr>
-            <p:style>
-              <a:lnRef idx="2">
-                <a:schemeClr val="accent3"/>
-              </a:lnRef>
-              <a:fillRef idx="1">
-                <a:schemeClr val="lt1"/>
-              </a:fillRef>
-              <a:effectRef idx="0">
-                <a:schemeClr val="accent3"/>
-              </a:effectRef>
-              <a:fontRef idx="minor">
-                <a:schemeClr val="dk1"/>
-              </a:fontRef>
-            </p:style>
-            <p:txBody>
-              <a:bodyPr rot="0" spcFirstLastPara="0" vertOverflow="overflow" horzOverflow="overflow" vert="horz" wrap="square" lIns="102870" tIns="51435" rIns="102870" bIns="51435" numCol="1" spcCol="0" rtlCol="0" fromWordArt="0" anchor="ctr" anchorCtr="0" forceAA="0" compatLnSpc="1">
-                <a:prstTxWarp prst="textNoShape">
-                  <a:avLst/>
-                </a:prstTxWarp>
-                <a:noAutofit/>
-              </a:bodyPr>
-              <a:lstStyle/>
-              <a:p>
-                <a:pPr algn="ctr"/>
-                <a:endParaRPr lang="en-US" sz="2430"/>
-              </a:p>
-            </p:txBody>
-          </p:sp>
-          <p:sp>
-            <p:nvSpPr>
-              <p:cNvPr id="20" name="Rectangle 19">
-                <a:extLst>
-                  <a:ext uri="{FF2B5EF4-FFF2-40B4-BE49-F238E27FC236}">
-                    <a16:creationId xmlns:a16="http://schemas.microsoft.com/office/drawing/2014/main" id="{D742027B-D684-A04F-90D3-46BC6338F50D}"/>
-                  </a:ext>
-                </a:extLst>
-              </p:cNvPr>
-              <p:cNvSpPr/>
-              <p:nvPr/>
-            </p:nvSpPr>
-            <p:spPr>
-              <a:xfrm>
-                <a:off x="2329132" y="1437736"/>
-                <a:ext cx="626853" cy="1040921"/>
-              </a:xfrm>
-              <a:prstGeom prst="rect">
-                <a:avLst/>
-              </a:prstGeom>
-              <a:noFill/>
-              <a:ln>
-                <a:solidFill>
-                  <a:schemeClr val="tx1"/>
-                </a:solidFill>
-              </a:ln>
-            </p:spPr>
-            <p:style>
-              <a:lnRef idx="2">
-                <a:schemeClr val="accent1">
-                  <a:shade val="50000"/>
-                </a:schemeClr>
-              </a:lnRef>
-              <a:fillRef idx="1">
-                <a:schemeClr val="accent1"/>
-              </a:fillRef>
-              <a:effectRef idx="0">
-                <a:schemeClr val="accent1"/>
-              </a:effectRef>
-              <a:fontRef idx="minor">
-                <a:schemeClr val="lt1"/>
-              </a:fontRef>
-            </p:style>
-            <p:txBody>
-              <a:bodyPr rot="0" spcFirstLastPara="0" vertOverflow="overflow" horzOverflow="overflow" vert="horz" wrap="square" lIns="102870" tIns="51435" rIns="102870" bIns="51435" numCol="1" spcCol="0" rtlCol="0" fromWordArt="0" anchor="ctr" anchorCtr="0" forceAA="0" compatLnSpc="1">
-                <a:prstTxWarp prst="textNoShape">
-                  <a:avLst/>
-                </a:prstTxWarp>
-                <a:noAutofit/>
-              </a:bodyPr>
-              <a:lstStyle/>
-              <a:p>
-                <a:pPr algn="ctr"/>
-                <a:endParaRPr lang="en-US" sz="2430"/>
-              </a:p>
-            </p:txBody>
-          </p:sp>
-          <p:sp>
-            <p:nvSpPr>
-              <p:cNvPr id="21" name="Rounded Rectangle 20">
-                <a:extLst>
-                  <a:ext uri="{FF2B5EF4-FFF2-40B4-BE49-F238E27FC236}">
-                    <a16:creationId xmlns:a16="http://schemas.microsoft.com/office/drawing/2014/main" id="{9B586CC1-A84B-D44E-AE72-329CD6185AAB}"/>
-                  </a:ext>
-                </a:extLst>
-              </p:cNvPr>
-              <p:cNvSpPr/>
-              <p:nvPr/>
-            </p:nvSpPr>
-            <p:spPr>
-              <a:xfrm>
-                <a:off x="2536195" y="2519057"/>
-                <a:ext cx="212725" cy="45719"/>
-              </a:xfrm>
-              <a:prstGeom prst="roundRect">
-                <a:avLst/>
-              </a:prstGeom>
-              <a:ln>
-                <a:solidFill>
-                  <a:schemeClr val="tx1"/>
-                </a:solidFill>
-              </a:ln>
-            </p:spPr>
-            <p:style>
-              <a:lnRef idx="2">
-                <a:schemeClr val="accent6"/>
-              </a:lnRef>
-              <a:fillRef idx="1">
-                <a:schemeClr val="lt1"/>
-              </a:fillRef>
-              <a:effectRef idx="0">
-                <a:schemeClr val="accent6"/>
-              </a:effectRef>
-              <a:fontRef idx="minor">
-                <a:schemeClr val="dk1"/>
-              </a:fontRef>
-            </p:style>
-            <p:txBody>
-              <a:bodyPr rot="0" spcFirstLastPara="0" vertOverflow="overflow" horzOverflow="overflow" vert="horz" wrap="square" lIns="102870" tIns="51435" rIns="102870" bIns="51435" numCol="1" spcCol="0" rtlCol="0" fromWordArt="0" anchor="ctr" anchorCtr="0" forceAA="0" compatLnSpc="1">
-                <a:prstTxWarp prst="textNoShape">
-                  <a:avLst/>
-                </a:prstTxWarp>
-                <a:noAutofit/>
-              </a:bodyPr>
-              <a:lstStyle/>
-              <a:p>
-                <a:pPr algn="ctr"/>
-                <a:endParaRPr lang="en-US" sz="2430"/>
-              </a:p>
-            </p:txBody>
-          </p:sp>
-        </p:grpSp>
-        <mc:AlternateContent xmlns:mc="http://schemas.openxmlformats.org/markup-compatibility/2006" xmlns:p14="http://schemas.microsoft.com/office/powerpoint/2010/main">
-          <mc:Choice Requires="p14">
-            <p:contentPart p14:bwMode="auto" r:id="rId2">
-              <p14:nvContentPartPr>
-                <p14:cNvPr id="35" name="Ink 34">
-                  <a:extLst>
-                    <a:ext uri="{FF2B5EF4-FFF2-40B4-BE49-F238E27FC236}">
-                      <a16:creationId xmlns:a16="http://schemas.microsoft.com/office/drawing/2014/main" id="{91F3F1C8-148B-514D-AAB5-28ECC6DDD855}"/>
-                    </a:ext>
-                  </a:extLst>
-                </p14:cNvPr>
-                <p14:cNvContentPartPr/>
-                <p14:nvPr/>
-              </p14:nvContentPartPr>
-              <p14:xfrm>
-                <a:off x="1035552" y="1603537"/>
-                <a:ext cx="502560" cy="596880"/>
-              </p14:xfrm>
-            </p:contentPart>
-          </mc:Choice>
-          <mc:Fallback xmlns="">
-            <p:pic>
-              <p:nvPicPr>
-                <p:cNvPr id="35" name="Ink 34">
-                  <a:extLst>
-                    <a:ext uri="{FF2B5EF4-FFF2-40B4-BE49-F238E27FC236}">
-                      <a16:creationId xmlns:a16="http://schemas.microsoft.com/office/drawing/2014/main" id="{91F3F1C8-148B-514D-AAB5-28ECC6DDD855}"/>
-                    </a:ext>
-                  </a:extLst>
-                </p:cNvPr>
-                <p:cNvPicPr/>
-                <p:nvPr/>
-              </p:nvPicPr>
-              <p:blipFill>
-                <a:blip r:embed="rId3"/>
-                <a:stretch>
-                  <a:fillRect/>
-                </a:stretch>
-              </p:blipFill>
-              <p:spPr>
-                <a:xfrm>
-                  <a:off x="1024348" y="1592335"/>
-                  <a:ext cx="524967" cy="619283"/>
-                </a:xfrm>
-                <a:prstGeom prst="rect">
-                  <a:avLst/>
-                </a:prstGeom>
-              </p:spPr>
-            </p:pic>
-          </mc:Fallback>
-        </mc:AlternateContent>
-      </p:grpSp>
-      <p:grpSp>
-        <p:nvGrpSpPr>
           <p:cNvPr id="101" name="Group 100">
             <a:extLst>
               <a:ext uri="{FF2B5EF4-FFF2-40B4-BE49-F238E27FC236}">
@@ -3364,8 +3115,8 @@
         </p:nvGrpSpPr>
         <p:grpSpPr>
           <a:xfrm>
-            <a:off x="10893436" y="1138289"/>
-            <a:ext cx="755120" cy="1436760"/>
+            <a:off x="11965728" y="900827"/>
+            <a:ext cx="914400" cy="1828800"/>
             <a:chOff x="2043119" y="1241937"/>
             <a:chExt cx="671218" cy="1277120"/>
           </a:xfrm>
@@ -3558,7 +3309,7 @@
         </p:grpSp>
         <mc:AlternateContent xmlns:mc="http://schemas.openxmlformats.org/markup-compatibility/2006" xmlns:p14="http://schemas.microsoft.com/office/powerpoint/2010/main">
           <mc:Choice Requires="p14">
-            <p:contentPart p14:bwMode="auto" r:id="rId4">
+            <p:contentPart p14:bwMode="auto" r:id="rId2">
               <p14:nvContentPartPr>
                 <p14:cNvPr id="77" name="Ink 76">
                   <a:extLst>
@@ -3622,8 +3373,8 @@
         </p:nvGrpSpPr>
         <p:grpSpPr>
           <a:xfrm>
-            <a:off x="499406" y="1185656"/>
-            <a:ext cx="755120" cy="1436760"/>
+            <a:off x="1064310" y="950940"/>
+            <a:ext cx="914400" cy="1828800"/>
             <a:chOff x="3142797" y="1263417"/>
             <a:chExt cx="671218" cy="1277120"/>
           </a:xfrm>
@@ -3880,14 +3631,14 @@
         </p:nvSpPr>
         <p:spPr>
           <a:xfrm>
-            <a:off x="2784168" y="3954687"/>
-            <a:ext cx="10623462" cy="4335813"/>
+            <a:off x="3169176" y="3954687"/>
+            <a:ext cx="11364400" cy="4335813"/>
           </a:xfrm>
           <a:prstGeom prst="rect">
             <a:avLst/>
           </a:prstGeom>
           <a:noFill/>
-          <a:ln>
+          <a:ln w="38100">
             <a:solidFill>
               <a:schemeClr val="tx1"/>
             </a:solidFill>
@@ -3937,7 +3688,7 @@
         </p:nvGrpSpPr>
         <p:grpSpPr>
           <a:xfrm>
-            <a:off x="3855885" y="655587"/>
+            <a:off x="4240893" y="655587"/>
             <a:ext cx="5985800" cy="2373923"/>
             <a:chOff x="2246894" y="1597179"/>
             <a:chExt cx="5985800" cy="2373923"/>
@@ -3964,7 +3715,7 @@
               <a:avLst/>
             </a:prstGeom>
             <a:noFill/>
-            <a:ln>
+            <a:ln w="38100">
               <a:solidFill>
                 <a:schemeClr val="tx1"/>
               </a:solidFill>
@@ -4021,7 +3772,7 @@
               <a:avLst/>
             </a:prstGeom>
             <a:noFill/>
-            <a:ln>
+            <a:ln w="38100">
               <a:solidFill>
                 <a:schemeClr val="tx1"/>
               </a:solidFill>
@@ -4079,7 +3830,7 @@
             <a:prstGeom prst="straightConnector1">
               <a:avLst/>
             </a:prstGeom>
-            <a:ln>
+            <a:ln w="38100">
               <a:solidFill>
                 <a:schemeClr val="tx1"/>
               </a:solidFill>
@@ -4123,7 +3874,7 @@
             <a:prstGeom prst="straightConnector1">
               <a:avLst/>
             </a:prstGeom>
-            <a:ln>
+            <a:ln w="38100">
               <a:solidFill>
                 <a:schemeClr val="tx1"/>
               </a:solidFill>
@@ -4166,6 +3917,9 @@
               <a:avLst/>
             </a:prstGeom>
             <a:noFill/>
+            <a:ln w="38100">
+              <a:noFill/>
+            </a:ln>
           </p:spPr>
           <p:txBody>
             <a:bodyPr wrap="square" rtlCol="0">
@@ -4204,6 +3958,9 @@
               <a:avLst/>
             </a:prstGeom>
             <a:noFill/>
+            <a:ln w="38100">
+              <a:noFill/>
+            </a:ln>
           </p:spPr>
           <p:txBody>
             <a:bodyPr wrap="square" rtlCol="0">
@@ -4244,6 +4001,9 @@
             <a:solidFill>
               <a:schemeClr val="bg2"/>
             </a:solidFill>
+            <a:ln w="38100">
+              <a:noFill/>
+            </a:ln>
           </p:spPr>
           <p:txBody>
             <a:bodyPr wrap="none" rtlCol="0">
@@ -4282,7 +4042,7 @@
               <a:avLst/>
             </a:prstGeom>
             <a:noFill/>
-            <a:ln>
+            <a:ln w="38100">
               <a:solidFill>
                 <a:schemeClr val="tx1"/>
               </a:solidFill>
@@ -4319,12 +4079,69 @@
           </p:txBody>
         </p:sp>
       </p:grpSp>
+      <p:sp>
+        <p:nvSpPr>
+          <p:cNvPr id="122" name="Rectangle 121">
+            <a:extLst>
+              <a:ext uri="{FF2B5EF4-FFF2-40B4-BE49-F238E27FC236}">
+                <a16:creationId xmlns:a16="http://schemas.microsoft.com/office/drawing/2014/main" id="{AC91A99E-4F61-1A44-B545-416EECD81FB3}"/>
+              </a:ext>
+            </a:extLst>
+          </p:cNvPr>
+          <p:cNvSpPr/>
+          <p:nvPr/>
+        </p:nvSpPr>
+        <p:spPr>
+          <a:xfrm>
+            <a:off x="3521771" y="5068964"/>
+            <a:ext cx="3701984" cy="2577718"/>
+          </a:xfrm>
+          <a:prstGeom prst="rect">
+            <a:avLst/>
+          </a:prstGeom>
+          <a:noFill/>
+          <a:ln w="38100">
+            <a:solidFill>
+              <a:schemeClr val="tx1"/>
+            </a:solidFill>
+          </a:ln>
+        </p:spPr>
+        <p:style>
+          <a:lnRef idx="2">
+            <a:schemeClr val="accent1">
+              <a:shade val="50000"/>
+            </a:schemeClr>
+          </a:lnRef>
+          <a:fillRef idx="1">
+            <a:schemeClr val="accent1"/>
+          </a:fillRef>
+          <a:effectRef idx="0">
+            <a:schemeClr val="accent1"/>
+          </a:effectRef>
+          <a:fontRef idx="minor">
+            <a:schemeClr val="lt1"/>
+          </a:fontRef>
+        </p:style>
+        <p:txBody>
+          <a:bodyPr rot="0" spcFirstLastPara="0" vertOverflow="overflow" horzOverflow="overflow" vert="horz" wrap="square" lIns="91440" tIns="45720" rIns="91440" bIns="45720" numCol="1" spcCol="0" rtlCol="0" fromWordArt="0" anchor="ctr" anchorCtr="0" forceAA="0" compatLnSpc="1">
+            <a:prstTxWarp prst="textNoShape">
+              <a:avLst/>
+            </a:prstTxWarp>
+            <a:noAutofit/>
+          </a:bodyPr>
+          <a:lstStyle/>
+          <a:p>
+            <a:pPr algn="ctr"/>
+            <a:endParaRPr lang="en-US"/>
+          </a:p>
+        </p:txBody>
+      </p:sp>
       <p:grpSp>
         <p:nvGrpSpPr>
-          <p:cNvPr id="129" name="Group 128">
+          <p:cNvPr id="127" name="Group 126">
             <a:extLst>
               <a:ext uri="{FF2B5EF4-FFF2-40B4-BE49-F238E27FC236}">
-                <a16:creationId xmlns:a16="http://schemas.microsoft.com/office/drawing/2014/main" id="{16297F59-CDD0-5C42-B38D-6D5223478BF7}"/>
+                <a16:creationId xmlns:a16="http://schemas.microsoft.com/office/drawing/2014/main" id="{DC02EC60-D855-914C-94BA-EDC4F1A3FC2C}"/>
               </a:ext>
             </a:extLst>
           </p:cNvPr>
@@ -4333,18 +4150,18 @@
         </p:nvGrpSpPr>
         <p:grpSpPr>
           <a:xfrm>
-            <a:off x="3136763" y="5254983"/>
-            <a:ext cx="3701984" cy="2391699"/>
-            <a:chOff x="2484327" y="5439966"/>
-            <a:chExt cx="3701984" cy="2391699"/>
+            <a:off x="3674733" y="6001326"/>
+            <a:ext cx="1474835" cy="1355437"/>
+            <a:chOff x="2829334" y="6186310"/>
+            <a:chExt cx="1474835" cy="1355437"/>
           </a:xfrm>
         </p:grpSpPr>
         <p:sp>
           <p:nvSpPr>
-            <p:cNvPr id="122" name="Rectangle 121">
+            <p:cNvPr id="123" name="Terminator 122">
               <a:extLst>
                 <a:ext uri="{FF2B5EF4-FFF2-40B4-BE49-F238E27FC236}">
-                  <a16:creationId xmlns:a16="http://schemas.microsoft.com/office/drawing/2014/main" id="{AC91A99E-4F61-1A44-B545-416EECD81FB3}"/>
+                  <a16:creationId xmlns:a16="http://schemas.microsoft.com/office/drawing/2014/main" id="{303376D3-68AE-9645-80AD-05DAD5878AE6}"/>
                 </a:ext>
               </a:extLst>
             </p:cNvPr>
@@ -4353,14 +4170,14 @@
           </p:nvSpPr>
           <p:spPr>
             <a:xfrm>
-              <a:off x="2484327" y="5439966"/>
-              <a:ext cx="3701984" cy="2391699"/>
+              <a:off x="2863002" y="6186310"/>
+              <a:ext cx="1413562" cy="1355437"/>
             </a:xfrm>
-            <a:prstGeom prst="rect">
+            <a:prstGeom prst="flowChartTerminator">
               <a:avLst/>
             </a:prstGeom>
             <a:noFill/>
-            <a:ln>
+            <a:ln w="38100">
               <a:solidFill>
                 <a:schemeClr val="tx1"/>
               </a:solidFill>
@@ -4396,256 +4213,55 @@
             </a:p>
           </p:txBody>
         </p:sp>
-        <p:grpSp>
-          <p:nvGrpSpPr>
-            <p:cNvPr id="127" name="Group 126">
+        <p:sp>
+          <p:nvSpPr>
+            <p:cNvPr id="125" name="TextBox 124">
               <a:extLst>
                 <a:ext uri="{FF2B5EF4-FFF2-40B4-BE49-F238E27FC236}">
-                  <a16:creationId xmlns:a16="http://schemas.microsoft.com/office/drawing/2014/main" id="{DC02EC60-D855-914C-94BA-EDC4F1A3FC2C}"/>
+                  <a16:creationId xmlns:a16="http://schemas.microsoft.com/office/drawing/2014/main" id="{77C3E57F-3CB6-F446-B8D6-45A0FDF0DB54}"/>
                 </a:ext>
               </a:extLst>
             </p:cNvPr>
-            <p:cNvGrpSpPr/>
+            <p:cNvSpPr txBox="1"/>
             <p:nvPr/>
-          </p:nvGrpSpPr>
-          <p:grpSpPr>
+          </p:nvSpPr>
+          <p:spPr>
             <a:xfrm>
-              <a:off x="2833377" y="6186310"/>
-              <a:ext cx="1251141" cy="1016000"/>
-              <a:chOff x="3025422" y="6186311"/>
-              <a:chExt cx="1251141" cy="1016000"/>
+              <a:off x="2829334" y="6602417"/>
+              <a:ext cx="1474835" cy="523220"/>
             </a:xfrm>
-          </p:grpSpPr>
-          <p:sp>
-            <p:nvSpPr>
-              <p:cNvPr id="123" name="Terminator 122">
-                <a:extLst>
-                  <a:ext uri="{FF2B5EF4-FFF2-40B4-BE49-F238E27FC236}">
-                    <a16:creationId xmlns:a16="http://schemas.microsoft.com/office/drawing/2014/main" id="{303376D3-68AE-9645-80AD-05DAD5878AE6}"/>
-                  </a:ext>
-                </a:extLst>
-              </p:cNvPr>
-              <p:cNvSpPr/>
-              <p:nvPr/>
-            </p:nvSpPr>
-            <p:spPr>
-              <a:xfrm>
-                <a:off x="3025422" y="6186311"/>
-                <a:ext cx="1251141" cy="1016000"/>
-              </a:xfrm>
-              <a:prstGeom prst="flowChartTerminator">
-                <a:avLst/>
-              </a:prstGeom>
+            <a:prstGeom prst="rect">
+              <a:avLst/>
+            </a:prstGeom>
+            <a:noFill/>
+            <a:ln w="38100">
               <a:noFill/>
-              <a:ln>
-                <a:solidFill>
-                  <a:schemeClr val="tx1"/>
-                </a:solidFill>
-              </a:ln>
-            </p:spPr>
-            <p:style>
-              <a:lnRef idx="2">
-                <a:schemeClr val="accent1">
-                  <a:shade val="50000"/>
-                </a:schemeClr>
-              </a:lnRef>
-              <a:fillRef idx="1">
-                <a:schemeClr val="accent1"/>
-              </a:fillRef>
-              <a:effectRef idx="0">
-                <a:schemeClr val="accent1"/>
-              </a:effectRef>
-              <a:fontRef idx="minor">
-                <a:schemeClr val="lt1"/>
-              </a:fontRef>
-            </p:style>
-            <p:txBody>
-              <a:bodyPr rot="0" spcFirstLastPara="0" vertOverflow="overflow" horzOverflow="overflow" vert="horz" wrap="square" lIns="91440" tIns="45720" rIns="91440" bIns="45720" numCol="1" spcCol="0" rtlCol="0" fromWordArt="0" anchor="ctr" anchorCtr="0" forceAA="0" compatLnSpc="1">
-                <a:prstTxWarp prst="textNoShape">
-                  <a:avLst/>
-                </a:prstTxWarp>
-                <a:noAutofit/>
-              </a:bodyPr>
-              <a:lstStyle/>
-              <a:p>
-                <a:pPr algn="ctr"/>
-                <a:endParaRPr lang="en-US"/>
-              </a:p>
-            </p:txBody>
-          </p:sp>
-          <p:sp>
-            <p:nvSpPr>
-              <p:cNvPr id="125" name="TextBox 124">
-                <a:extLst>
-                  <a:ext uri="{FF2B5EF4-FFF2-40B4-BE49-F238E27FC236}">
-                    <a16:creationId xmlns:a16="http://schemas.microsoft.com/office/drawing/2014/main" id="{77C3E57F-3CB6-F446-B8D6-45A0FDF0DB54}"/>
-                  </a:ext>
-                </a:extLst>
-              </p:cNvPr>
-              <p:cNvSpPr txBox="1"/>
-              <p:nvPr/>
-            </p:nvSpPr>
-            <p:spPr>
-              <a:xfrm>
-                <a:off x="3161018" y="6371145"/>
-                <a:ext cx="1029321" cy="646331"/>
-              </a:xfrm>
-              <a:prstGeom prst="rect">
-                <a:avLst/>
-              </a:prstGeom>
-              <a:noFill/>
-            </p:spPr>
-            <p:txBody>
-              <a:bodyPr wrap="none" rtlCol="0">
-                <a:spAutoFit/>
-              </a:bodyPr>
-              <a:lstStyle/>
-              <a:p>
-                <a:pPr algn="ctr"/>
-                <a:r>
-                  <a:rPr lang="en-US" dirty="0">
-                    <a:latin typeface="Times New Roman" panose="02020603050405020304" pitchFamily="18" charset="0"/>
-                    <a:cs typeface="Times New Roman" panose="02020603050405020304" pitchFamily="18" charset="0"/>
-                  </a:rPr>
-                  <a:t>Training </a:t>
-                </a:r>
-              </a:p>
-              <a:p>
-                <a:pPr algn="ctr"/>
-                <a:r>
-                  <a:rPr lang="en-US" dirty="0">
-                    <a:latin typeface="Times New Roman" panose="02020603050405020304" pitchFamily="18" charset="0"/>
-                    <a:cs typeface="Times New Roman" panose="02020603050405020304" pitchFamily="18" charset="0"/>
-                  </a:rPr>
-                  <a:t>Model</a:t>
-                </a:r>
-              </a:p>
-            </p:txBody>
-          </p:sp>
-        </p:grpSp>
-        <p:grpSp>
-          <p:nvGrpSpPr>
-            <p:cNvPr id="128" name="Group 127">
-              <a:extLst>
-                <a:ext uri="{FF2B5EF4-FFF2-40B4-BE49-F238E27FC236}">
-                  <a16:creationId xmlns:a16="http://schemas.microsoft.com/office/drawing/2014/main" id="{E8A994DA-8542-754B-9A0A-F810AE51D799}"/>
-                </a:ext>
-              </a:extLst>
-            </p:cNvPr>
-            <p:cNvGrpSpPr/>
-            <p:nvPr/>
-          </p:nvGrpSpPr>
-          <p:grpSpPr>
-            <a:xfrm>
-              <a:off x="4560399" y="6186310"/>
-              <a:ext cx="1251141" cy="1016000"/>
-              <a:chOff x="5041697" y="6186311"/>
-              <a:chExt cx="1251141" cy="1016000"/>
-            </a:xfrm>
-          </p:grpSpPr>
-          <p:sp>
-            <p:nvSpPr>
-              <p:cNvPr id="124" name="Terminator 123">
-                <a:extLst>
-                  <a:ext uri="{FF2B5EF4-FFF2-40B4-BE49-F238E27FC236}">
-                    <a16:creationId xmlns:a16="http://schemas.microsoft.com/office/drawing/2014/main" id="{37F9AFF6-824D-0840-B005-F5B38A25D2D6}"/>
-                  </a:ext>
-                </a:extLst>
-              </p:cNvPr>
-              <p:cNvSpPr/>
-              <p:nvPr/>
-            </p:nvSpPr>
-            <p:spPr>
-              <a:xfrm>
-                <a:off x="5041697" y="6186311"/>
-                <a:ext cx="1251141" cy="1016000"/>
-              </a:xfrm>
-              <a:prstGeom prst="flowChartTerminator">
-                <a:avLst/>
-              </a:prstGeom>
-              <a:noFill/>
-              <a:ln>
-                <a:solidFill>
-                  <a:schemeClr val="tx1"/>
-                </a:solidFill>
-              </a:ln>
-            </p:spPr>
-            <p:style>
-              <a:lnRef idx="2">
-                <a:schemeClr val="accent1">
-                  <a:shade val="50000"/>
-                </a:schemeClr>
-              </a:lnRef>
-              <a:fillRef idx="1">
-                <a:schemeClr val="accent1"/>
-              </a:fillRef>
-              <a:effectRef idx="0">
-                <a:schemeClr val="accent1"/>
-              </a:effectRef>
-              <a:fontRef idx="minor">
-                <a:schemeClr val="lt1"/>
-              </a:fontRef>
-            </p:style>
-            <p:txBody>
-              <a:bodyPr rot="0" spcFirstLastPara="0" vertOverflow="overflow" horzOverflow="overflow" vert="horz" wrap="square" lIns="91440" tIns="45720" rIns="91440" bIns="45720" numCol="1" spcCol="0" rtlCol="0" fromWordArt="0" anchor="ctr" anchorCtr="0" forceAA="0" compatLnSpc="1">
-                <a:prstTxWarp prst="textNoShape">
-                  <a:avLst/>
-                </a:prstTxWarp>
-                <a:noAutofit/>
-              </a:bodyPr>
-              <a:lstStyle/>
-              <a:p>
-                <a:pPr algn="ctr"/>
-                <a:endParaRPr lang="en-US"/>
-              </a:p>
-            </p:txBody>
-          </p:sp>
-          <p:sp>
-            <p:nvSpPr>
-              <p:cNvPr id="126" name="TextBox 125">
-                <a:extLst>
-                  <a:ext uri="{FF2B5EF4-FFF2-40B4-BE49-F238E27FC236}">
-                    <a16:creationId xmlns:a16="http://schemas.microsoft.com/office/drawing/2014/main" id="{79F06DC7-2123-8F4C-84A8-37A27C51F286}"/>
-                  </a:ext>
-                </a:extLst>
-              </p:cNvPr>
-              <p:cNvSpPr txBox="1"/>
-              <p:nvPr/>
-            </p:nvSpPr>
-            <p:spPr>
-              <a:xfrm>
-                <a:off x="5249296" y="6509644"/>
-                <a:ext cx="890052" cy="369332"/>
-              </a:xfrm>
-              <a:prstGeom prst="rect">
-                <a:avLst/>
-              </a:prstGeom>
-              <a:noFill/>
-            </p:spPr>
-            <p:txBody>
-              <a:bodyPr wrap="none" rtlCol="0">
-                <a:spAutoFit/>
-              </a:bodyPr>
-              <a:lstStyle/>
-              <a:p>
-                <a:r>
-                  <a:rPr lang="en-US" dirty="0">
-                    <a:latin typeface="Times New Roman" panose="02020603050405020304" pitchFamily="18" charset="0"/>
-                    <a:cs typeface="Times New Roman" panose="02020603050405020304" pitchFamily="18" charset="0"/>
-                  </a:rPr>
-                  <a:t>Verifier</a:t>
-                </a:r>
-              </a:p>
-            </p:txBody>
-          </p:sp>
-        </p:grpSp>
+            </a:ln>
+          </p:spPr>
+          <p:txBody>
+            <a:bodyPr wrap="square" rtlCol="0">
+              <a:spAutoFit/>
+            </a:bodyPr>
+            <a:lstStyle/>
+            <a:p>
+              <a:pPr algn="ctr"/>
+              <a:r>
+                <a:rPr lang="en-US" sz="2800" dirty="0">
+                  <a:latin typeface="Times New Roman" panose="02020603050405020304" pitchFamily="18" charset="0"/>
+                  <a:cs typeface="Times New Roman" panose="02020603050405020304" pitchFamily="18" charset="0"/>
+                </a:rPr>
+                <a:t>Training </a:t>
+              </a:r>
+            </a:p>
+          </p:txBody>
+        </p:sp>
       </p:grpSp>
       <p:grpSp>
         <p:nvGrpSpPr>
-          <p:cNvPr id="130" name="Group 129">
+          <p:cNvPr id="128" name="Group 127">
             <a:extLst>
               <a:ext uri="{FF2B5EF4-FFF2-40B4-BE49-F238E27FC236}">
-                <a16:creationId xmlns:a16="http://schemas.microsoft.com/office/drawing/2014/main" id="{D04279CF-27FC-A740-92B9-0CBBF556BAA3}"/>
+                <a16:creationId xmlns:a16="http://schemas.microsoft.com/office/drawing/2014/main" id="{E8A994DA-8542-754B-9A0A-F810AE51D799}"/>
               </a:ext>
             </a:extLst>
           </p:cNvPr>
@@ -4654,18 +4270,18 @@
         </p:nvGrpSpPr>
         <p:grpSpPr>
           <a:xfrm>
-            <a:off x="9175803" y="5249069"/>
-            <a:ext cx="3701984" cy="2391699"/>
-            <a:chOff x="2484327" y="5439966"/>
-            <a:chExt cx="3701984" cy="2391699"/>
+            <a:off x="5597843" y="6001327"/>
+            <a:ext cx="1385646" cy="1355436"/>
+            <a:chOff x="5041697" y="6186311"/>
+            <a:chExt cx="1385646" cy="1355436"/>
           </a:xfrm>
         </p:grpSpPr>
         <p:sp>
           <p:nvSpPr>
-            <p:cNvPr id="131" name="Rectangle 130">
+            <p:cNvPr id="124" name="Terminator 123">
               <a:extLst>
                 <a:ext uri="{FF2B5EF4-FFF2-40B4-BE49-F238E27FC236}">
-                  <a16:creationId xmlns:a16="http://schemas.microsoft.com/office/drawing/2014/main" id="{50F8CBEB-E83C-7B4F-B855-4A8EE457382A}"/>
+                  <a16:creationId xmlns:a16="http://schemas.microsoft.com/office/drawing/2014/main" id="{37F9AFF6-824D-0840-B005-F5B38A25D2D6}"/>
                 </a:ext>
               </a:extLst>
             </p:cNvPr>
@@ -4674,14 +4290,14 @@
           </p:nvSpPr>
           <p:spPr>
             <a:xfrm>
-              <a:off x="2484327" y="5439966"/>
-              <a:ext cx="3701984" cy="2391699"/>
+              <a:off x="5041697" y="6186311"/>
+              <a:ext cx="1385646" cy="1355436"/>
             </a:xfrm>
-            <a:prstGeom prst="rect">
+            <a:prstGeom prst="flowChartTerminator">
               <a:avLst/>
             </a:prstGeom>
             <a:noFill/>
-            <a:ln>
+            <a:ln w="38100">
               <a:solidFill>
                 <a:schemeClr val="tx1"/>
               </a:solidFill>
@@ -4717,249 +4333,343 @@
             </a:p>
           </p:txBody>
         </p:sp>
-        <p:grpSp>
-          <p:nvGrpSpPr>
-            <p:cNvPr id="132" name="Group 131">
+        <p:sp>
+          <p:nvSpPr>
+            <p:cNvPr id="126" name="TextBox 125">
               <a:extLst>
                 <a:ext uri="{FF2B5EF4-FFF2-40B4-BE49-F238E27FC236}">
-                  <a16:creationId xmlns:a16="http://schemas.microsoft.com/office/drawing/2014/main" id="{B28A2233-7119-9F4A-A103-CDEDCD8F4BD0}"/>
+                  <a16:creationId xmlns:a16="http://schemas.microsoft.com/office/drawing/2014/main" id="{79F06DC7-2123-8F4C-84A8-37A27C51F286}"/>
                 </a:ext>
               </a:extLst>
             </p:cNvPr>
-            <p:cNvGrpSpPr/>
+            <p:cNvSpPr txBox="1"/>
             <p:nvPr/>
-          </p:nvGrpSpPr>
-          <p:grpSpPr>
+          </p:nvSpPr>
+          <p:spPr>
             <a:xfrm>
-              <a:off x="2833377" y="6186310"/>
-              <a:ext cx="1251141" cy="1016000"/>
-              <a:chOff x="3025422" y="6186311"/>
-              <a:chExt cx="1251141" cy="1016000"/>
+              <a:off x="5097068" y="6610599"/>
+              <a:ext cx="1281376" cy="523220"/>
             </a:xfrm>
-          </p:grpSpPr>
-          <p:sp>
-            <p:nvSpPr>
-              <p:cNvPr id="136" name="Terminator 135">
-                <a:extLst>
-                  <a:ext uri="{FF2B5EF4-FFF2-40B4-BE49-F238E27FC236}">
-                    <a16:creationId xmlns:a16="http://schemas.microsoft.com/office/drawing/2014/main" id="{4BB809FC-2810-7341-B1CC-EBD3D368787F}"/>
-                  </a:ext>
-                </a:extLst>
-              </p:cNvPr>
-              <p:cNvSpPr/>
-              <p:nvPr/>
-            </p:nvSpPr>
-            <p:spPr>
-              <a:xfrm>
-                <a:off x="3025422" y="6186311"/>
-                <a:ext cx="1251141" cy="1016000"/>
-              </a:xfrm>
-              <a:prstGeom prst="flowChartTerminator">
-                <a:avLst/>
-              </a:prstGeom>
+            <a:prstGeom prst="rect">
+              <a:avLst/>
+            </a:prstGeom>
+            <a:noFill/>
+            <a:ln w="38100">
               <a:noFill/>
-              <a:ln>
-                <a:solidFill>
-                  <a:schemeClr val="tx1"/>
-                </a:solidFill>
-              </a:ln>
-            </p:spPr>
-            <p:style>
-              <a:lnRef idx="2">
-                <a:schemeClr val="accent1">
-                  <a:shade val="50000"/>
-                </a:schemeClr>
-              </a:lnRef>
-              <a:fillRef idx="1">
-                <a:schemeClr val="accent1"/>
-              </a:fillRef>
-              <a:effectRef idx="0">
-                <a:schemeClr val="accent1"/>
-              </a:effectRef>
-              <a:fontRef idx="minor">
-                <a:schemeClr val="lt1"/>
-              </a:fontRef>
-            </p:style>
-            <p:txBody>
-              <a:bodyPr rot="0" spcFirstLastPara="0" vertOverflow="overflow" horzOverflow="overflow" vert="horz" wrap="square" lIns="91440" tIns="45720" rIns="91440" bIns="45720" numCol="1" spcCol="0" rtlCol="0" fromWordArt="0" anchor="ctr" anchorCtr="0" forceAA="0" compatLnSpc="1">
-                <a:prstTxWarp prst="textNoShape">
-                  <a:avLst/>
-                </a:prstTxWarp>
-                <a:noAutofit/>
-              </a:bodyPr>
-              <a:lstStyle/>
-              <a:p>
-                <a:pPr algn="ctr"/>
-                <a:endParaRPr lang="en-US"/>
-              </a:p>
-            </p:txBody>
-          </p:sp>
-          <p:sp>
-            <p:nvSpPr>
-              <p:cNvPr id="137" name="TextBox 136">
-                <a:extLst>
-                  <a:ext uri="{FF2B5EF4-FFF2-40B4-BE49-F238E27FC236}">
-                    <a16:creationId xmlns:a16="http://schemas.microsoft.com/office/drawing/2014/main" id="{35F74369-D6C3-184E-AE74-46369EC8AD07}"/>
-                  </a:ext>
-                </a:extLst>
-              </p:cNvPr>
-              <p:cNvSpPr txBox="1"/>
-              <p:nvPr/>
-            </p:nvSpPr>
-            <p:spPr>
-              <a:xfrm>
-                <a:off x="3161018" y="6371145"/>
-                <a:ext cx="1029321" cy="646331"/>
-              </a:xfrm>
-              <a:prstGeom prst="rect">
-                <a:avLst/>
-              </a:prstGeom>
-              <a:noFill/>
-            </p:spPr>
-            <p:txBody>
-              <a:bodyPr wrap="none" rtlCol="0">
-                <a:spAutoFit/>
-              </a:bodyPr>
-              <a:lstStyle/>
-              <a:p>
-                <a:pPr algn="ctr"/>
-                <a:r>
-                  <a:rPr lang="en-US" dirty="0">
-                    <a:latin typeface="Times New Roman" panose="02020603050405020304" pitchFamily="18" charset="0"/>
-                    <a:cs typeface="Times New Roman" panose="02020603050405020304" pitchFamily="18" charset="0"/>
-                  </a:rPr>
-                  <a:t>Training </a:t>
-                </a:r>
-              </a:p>
-              <a:p>
-                <a:pPr algn="ctr"/>
-                <a:r>
-                  <a:rPr lang="en-US" dirty="0">
-                    <a:latin typeface="Times New Roman" panose="02020603050405020304" pitchFamily="18" charset="0"/>
-                    <a:cs typeface="Times New Roman" panose="02020603050405020304" pitchFamily="18" charset="0"/>
-                  </a:rPr>
-                  <a:t>Model</a:t>
-                </a:r>
-              </a:p>
-            </p:txBody>
-          </p:sp>
-        </p:grpSp>
-        <p:grpSp>
-          <p:nvGrpSpPr>
-            <p:cNvPr id="133" name="Group 132">
+            </a:ln>
+          </p:spPr>
+          <p:txBody>
+            <a:bodyPr wrap="none" rtlCol="0">
+              <a:spAutoFit/>
+            </a:bodyPr>
+            <a:lstStyle/>
+            <a:p>
+              <a:r>
+                <a:rPr lang="en-US" sz="2800" dirty="0">
+                  <a:latin typeface="Times New Roman" panose="02020603050405020304" pitchFamily="18" charset="0"/>
+                  <a:cs typeface="Times New Roman" panose="02020603050405020304" pitchFamily="18" charset="0"/>
+                </a:rPr>
+                <a:t>Verifier</a:t>
+              </a:r>
+            </a:p>
+          </p:txBody>
+        </p:sp>
+      </p:grpSp>
+      <p:sp>
+        <p:nvSpPr>
+          <p:cNvPr id="131" name="Rectangle 130">
+            <a:extLst>
+              <a:ext uri="{FF2B5EF4-FFF2-40B4-BE49-F238E27FC236}">
+                <a16:creationId xmlns:a16="http://schemas.microsoft.com/office/drawing/2014/main" id="{50F8CBEB-E83C-7B4F-B855-4A8EE457382A}"/>
+              </a:ext>
+            </a:extLst>
+          </p:cNvPr>
+          <p:cNvSpPr/>
+          <p:nvPr/>
+        </p:nvSpPr>
+        <p:spPr>
+          <a:xfrm>
+            <a:off x="10476402" y="4260475"/>
+            <a:ext cx="3584919" cy="3305002"/>
+          </a:xfrm>
+          <a:prstGeom prst="rect">
+            <a:avLst/>
+          </a:prstGeom>
+          <a:noFill/>
+          <a:ln w="38100">
+            <a:solidFill>
+              <a:schemeClr val="tx1"/>
+            </a:solidFill>
+          </a:ln>
+        </p:spPr>
+        <p:style>
+          <a:lnRef idx="2">
+            <a:schemeClr val="accent1">
+              <a:shade val="50000"/>
+            </a:schemeClr>
+          </a:lnRef>
+          <a:fillRef idx="1">
+            <a:schemeClr val="accent1"/>
+          </a:fillRef>
+          <a:effectRef idx="0">
+            <a:schemeClr val="accent1"/>
+          </a:effectRef>
+          <a:fontRef idx="minor">
+            <a:schemeClr val="lt1"/>
+          </a:fontRef>
+        </p:style>
+        <p:txBody>
+          <a:bodyPr rot="0" spcFirstLastPara="0" vertOverflow="overflow" horzOverflow="overflow" vert="horz" wrap="square" lIns="91440" tIns="45720" rIns="91440" bIns="45720" numCol="1" spcCol="0" rtlCol="0" fromWordArt="0" anchor="ctr" anchorCtr="0" forceAA="0" compatLnSpc="1">
+            <a:prstTxWarp prst="textNoShape">
+              <a:avLst/>
+            </a:prstTxWarp>
+            <a:noAutofit/>
+          </a:bodyPr>
+          <a:lstStyle/>
+          <a:p>
+            <a:pPr algn="ctr"/>
+            <a:endParaRPr lang="en-US"/>
+          </a:p>
+        </p:txBody>
+      </p:sp>
+      <p:grpSp>
+        <p:nvGrpSpPr>
+          <p:cNvPr id="132" name="Group 131">
+            <a:extLst>
+              <a:ext uri="{FF2B5EF4-FFF2-40B4-BE49-F238E27FC236}">
+                <a16:creationId xmlns:a16="http://schemas.microsoft.com/office/drawing/2014/main" id="{B28A2233-7119-9F4A-A103-CDEDCD8F4BD0}"/>
+              </a:ext>
+            </a:extLst>
+          </p:cNvPr>
+          <p:cNvGrpSpPr/>
+          <p:nvPr/>
+        </p:nvGrpSpPr>
+        <p:grpSpPr>
+          <a:xfrm>
+            <a:off x="12274649" y="4727448"/>
+            <a:ext cx="1539548" cy="1165000"/>
+            <a:chOff x="3102758" y="6186311"/>
+            <a:chExt cx="1173805" cy="1016000"/>
+          </a:xfrm>
+        </p:grpSpPr>
+        <p:sp>
+          <p:nvSpPr>
+            <p:cNvPr id="136" name="Terminator 135">
               <a:extLst>
                 <a:ext uri="{FF2B5EF4-FFF2-40B4-BE49-F238E27FC236}">
-                  <a16:creationId xmlns:a16="http://schemas.microsoft.com/office/drawing/2014/main" id="{35EBDBF2-43EF-3844-95CA-BDB4C80A1DDA}"/>
+                  <a16:creationId xmlns:a16="http://schemas.microsoft.com/office/drawing/2014/main" id="{4BB809FC-2810-7341-B1CC-EBD3D368787F}"/>
                 </a:ext>
               </a:extLst>
             </p:cNvPr>
-            <p:cNvGrpSpPr/>
+            <p:cNvSpPr/>
             <p:nvPr/>
-          </p:nvGrpSpPr>
-          <p:grpSpPr>
+          </p:nvSpPr>
+          <p:spPr>
             <a:xfrm>
-              <a:off x="4560399" y="6186310"/>
-              <a:ext cx="1251141" cy="1016000"/>
-              <a:chOff x="5041697" y="6186311"/>
-              <a:chExt cx="1251141" cy="1016000"/>
+              <a:off x="3104480" y="6186311"/>
+              <a:ext cx="1172083" cy="1016000"/>
             </a:xfrm>
-          </p:grpSpPr>
-          <p:sp>
-            <p:nvSpPr>
-              <p:cNvPr id="134" name="Terminator 133">
-                <a:extLst>
-                  <a:ext uri="{FF2B5EF4-FFF2-40B4-BE49-F238E27FC236}">
-                    <a16:creationId xmlns:a16="http://schemas.microsoft.com/office/drawing/2014/main" id="{E930A08E-746A-1F46-B199-BD45DDA80AB5}"/>
-                  </a:ext>
-                </a:extLst>
-              </p:cNvPr>
-              <p:cNvSpPr/>
-              <p:nvPr/>
-            </p:nvSpPr>
-            <p:spPr>
-              <a:xfrm>
-                <a:off x="5041697" y="6186311"/>
-                <a:ext cx="1251141" cy="1016000"/>
-              </a:xfrm>
-              <a:prstGeom prst="flowChartTerminator">
+            <a:prstGeom prst="flowChartTerminator">
+              <a:avLst/>
+            </a:prstGeom>
+            <a:noFill/>
+            <a:ln w="38100">
+              <a:solidFill>
+                <a:schemeClr val="tx1"/>
+              </a:solidFill>
+            </a:ln>
+          </p:spPr>
+          <p:style>
+            <a:lnRef idx="2">
+              <a:schemeClr val="accent1">
+                <a:shade val="50000"/>
+              </a:schemeClr>
+            </a:lnRef>
+            <a:fillRef idx="1">
+              <a:schemeClr val="accent1"/>
+            </a:fillRef>
+            <a:effectRef idx="0">
+              <a:schemeClr val="accent1"/>
+            </a:effectRef>
+            <a:fontRef idx="minor">
+              <a:schemeClr val="lt1"/>
+            </a:fontRef>
+          </p:style>
+          <p:txBody>
+            <a:bodyPr rot="0" spcFirstLastPara="0" vertOverflow="overflow" horzOverflow="overflow" vert="horz" wrap="square" lIns="91440" tIns="45720" rIns="91440" bIns="45720" numCol="1" spcCol="0" rtlCol="0" fromWordArt="0" anchor="ctr" anchorCtr="0" forceAA="0" compatLnSpc="1">
+              <a:prstTxWarp prst="textNoShape">
                 <a:avLst/>
-              </a:prstGeom>
+              </a:prstTxWarp>
+              <a:noAutofit/>
+            </a:bodyPr>
+            <a:lstStyle/>
+            <a:p>
+              <a:pPr algn="ctr"/>
+              <a:endParaRPr lang="en-US"/>
+            </a:p>
+          </p:txBody>
+        </p:sp>
+        <p:sp>
+          <p:nvSpPr>
+            <p:cNvPr id="137" name="TextBox 136">
+              <a:extLst>
+                <a:ext uri="{FF2B5EF4-FFF2-40B4-BE49-F238E27FC236}">
+                  <a16:creationId xmlns:a16="http://schemas.microsoft.com/office/drawing/2014/main" id="{35F74369-D6C3-184E-AE74-46369EC8AD07}"/>
+                </a:ext>
+              </a:extLst>
+            </p:cNvPr>
+            <p:cNvSpPr txBox="1"/>
+            <p:nvPr/>
+          </p:nvSpPr>
+          <p:spPr>
+            <a:xfrm>
+              <a:off x="3102758" y="6487633"/>
+              <a:ext cx="1172083" cy="402619"/>
+            </a:xfrm>
+            <a:prstGeom prst="rect">
+              <a:avLst/>
+            </a:prstGeom>
+            <a:noFill/>
+            <a:ln w="38100">
               <a:noFill/>
-              <a:ln>
-                <a:solidFill>
-                  <a:schemeClr val="tx1"/>
-                </a:solidFill>
-              </a:ln>
-            </p:spPr>
-            <p:style>
-              <a:lnRef idx="2">
-                <a:schemeClr val="accent1">
-                  <a:shade val="50000"/>
-                </a:schemeClr>
-              </a:lnRef>
-              <a:fillRef idx="1">
-                <a:schemeClr val="accent1"/>
-              </a:fillRef>
-              <a:effectRef idx="0">
-                <a:schemeClr val="accent1"/>
-              </a:effectRef>
-              <a:fontRef idx="minor">
-                <a:schemeClr val="lt1"/>
-              </a:fontRef>
-            </p:style>
-            <p:txBody>
-              <a:bodyPr rot="0" spcFirstLastPara="0" vertOverflow="overflow" horzOverflow="overflow" vert="horz" wrap="square" lIns="91440" tIns="45720" rIns="91440" bIns="45720" numCol="1" spcCol="0" rtlCol="0" fromWordArt="0" anchor="ctr" anchorCtr="0" forceAA="0" compatLnSpc="1">
-                <a:prstTxWarp prst="textNoShape">
-                  <a:avLst/>
-                </a:prstTxWarp>
-                <a:noAutofit/>
-              </a:bodyPr>
-              <a:lstStyle/>
-              <a:p>
-                <a:pPr algn="ctr"/>
-                <a:endParaRPr lang="en-US"/>
-              </a:p>
-            </p:txBody>
-          </p:sp>
-          <p:sp>
-            <p:nvSpPr>
-              <p:cNvPr id="135" name="TextBox 134">
-                <a:extLst>
-                  <a:ext uri="{FF2B5EF4-FFF2-40B4-BE49-F238E27FC236}">
-                    <a16:creationId xmlns:a16="http://schemas.microsoft.com/office/drawing/2014/main" id="{00A3E9E6-63F7-8A40-8387-9CFB468F653D}"/>
-                  </a:ext>
-                </a:extLst>
-              </p:cNvPr>
-              <p:cNvSpPr txBox="1"/>
-              <p:nvPr/>
-            </p:nvSpPr>
-            <p:spPr>
-              <a:xfrm>
-                <a:off x="5249296" y="6509644"/>
-                <a:ext cx="890052" cy="369332"/>
-              </a:xfrm>
-              <a:prstGeom prst="rect">
+            </a:ln>
+          </p:spPr>
+          <p:txBody>
+            <a:bodyPr wrap="square" rtlCol="0">
+              <a:spAutoFit/>
+            </a:bodyPr>
+            <a:lstStyle/>
+            <a:p>
+              <a:pPr algn="ctr"/>
+              <a:r>
+                <a:rPr lang="en-US" sz="2400" dirty="0">
+                  <a:latin typeface="Times New Roman" panose="02020603050405020304" pitchFamily="18" charset="0"/>
+                  <a:cs typeface="Times New Roman" panose="02020603050405020304" pitchFamily="18" charset="0"/>
+                </a:rPr>
+                <a:t>Classifier</a:t>
+              </a:r>
+            </a:p>
+          </p:txBody>
+        </p:sp>
+      </p:grpSp>
+      <p:grpSp>
+        <p:nvGrpSpPr>
+          <p:cNvPr id="133" name="Group 132">
+            <a:extLst>
+              <a:ext uri="{FF2B5EF4-FFF2-40B4-BE49-F238E27FC236}">
+                <a16:creationId xmlns:a16="http://schemas.microsoft.com/office/drawing/2014/main" id="{35EBDBF2-43EF-3844-95CA-BDB4C80A1DDA}"/>
+              </a:ext>
+            </a:extLst>
+          </p:cNvPr>
+          <p:cNvGrpSpPr/>
+          <p:nvPr/>
+        </p:nvGrpSpPr>
+        <p:grpSpPr>
+          <a:xfrm>
+            <a:off x="12264112" y="6145361"/>
+            <a:ext cx="1537290" cy="1059663"/>
+            <a:chOff x="5041697" y="5944751"/>
+            <a:chExt cx="1603710" cy="1249335"/>
+          </a:xfrm>
+        </p:grpSpPr>
+        <p:sp>
+          <p:nvSpPr>
+            <p:cNvPr id="134" name="Terminator 133">
+              <a:extLst>
+                <a:ext uri="{FF2B5EF4-FFF2-40B4-BE49-F238E27FC236}">
+                  <a16:creationId xmlns:a16="http://schemas.microsoft.com/office/drawing/2014/main" id="{E930A08E-746A-1F46-B199-BD45DDA80AB5}"/>
+                </a:ext>
+              </a:extLst>
+            </p:cNvPr>
+            <p:cNvSpPr/>
+            <p:nvPr/>
+          </p:nvSpPr>
+          <p:spPr>
+            <a:xfrm>
+              <a:off x="5041697" y="5944751"/>
+              <a:ext cx="1603710" cy="1249335"/>
+            </a:xfrm>
+            <a:prstGeom prst="flowChartTerminator">
+              <a:avLst/>
+            </a:prstGeom>
+            <a:noFill/>
+            <a:ln w="38100">
+              <a:solidFill>
+                <a:schemeClr val="tx1"/>
+              </a:solidFill>
+            </a:ln>
+          </p:spPr>
+          <p:style>
+            <a:lnRef idx="2">
+              <a:schemeClr val="accent1">
+                <a:shade val="50000"/>
+              </a:schemeClr>
+            </a:lnRef>
+            <a:fillRef idx="1">
+              <a:schemeClr val="accent1"/>
+            </a:fillRef>
+            <a:effectRef idx="0">
+              <a:schemeClr val="accent1"/>
+            </a:effectRef>
+            <a:fontRef idx="minor">
+              <a:schemeClr val="lt1"/>
+            </a:fontRef>
+          </p:style>
+          <p:txBody>
+            <a:bodyPr rot="0" spcFirstLastPara="0" vertOverflow="overflow" horzOverflow="overflow" vert="horz" wrap="square" lIns="91440" tIns="45720" rIns="91440" bIns="45720" numCol="1" spcCol="0" rtlCol="0" fromWordArt="0" anchor="ctr" anchorCtr="0" forceAA="0" compatLnSpc="1">
+              <a:prstTxWarp prst="textNoShape">
                 <a:avLst/>
-              </a:prstGeom>
+              </a:prstTxWarp>
+              <a:noAutofit/>
+            </a:bodyPr>
+            <a:lstStyle/>
+            <a:p>
+              <a:pPr algn="ctr"/>
+              <a:endParaRPr lang="en-US"/>
+            </a:p>
+          </p:txBody>
+        </p:sp>
+        <p:sp>
+          <p:nvSpPr>
+            <p:cNvPr id="135" name="TextBox 134">
+              <a:extLst>
+                <a:ext uri="{FF2B5EF4-FFF2-40B4-BE49-F238E27FC236}">
+                  <a16:creationId xmlns:a16="http://schemas.microsoft.com/office/drawing/2014/main" id="{00A3E9E6-63F7-8A40-8387-9CFB468F653D}"/>
+                </a:ext>
+              </a:extLst>
+            </p:cNvPr>
+            <p:cNvSpPr txBox="1"/>
+            <p:nvPr/>
+          </p:nvSpPr>
+          <p:spPr>
+            <a:xfrm>
+              <a:off x="5253313" y="6281307"/>
+              <a:ext cx="1055674" cy="616873"/>
+            </a:xfrm>
+            <a:prstGeom prst="rect">
+              <a:avLst/>
+            </a:prstGeom>
+            <a:noFill/>
+            <a:ln w="38100">
               <a:noFill/>
-            </p:spPr>
-            <p:txBody>
-              <a:bodyPr wrap="none" rtlCol="0">
-                <a:spAutoFit/>
-              </a:bodyPr>
-              <a:lstStyle/>
-              <a:p>
-                <a:r>
-                  <a:rPr lang="en-US" dirty="0">
-                    <a:latin typeface="Times New Roman" panose="02020603050405020304" pitchFamily="18" charset="0"/>
-                    <a:cs typeface="Times New Roman" panose="02020603050405020304" pitchFamily="18" charset="0"/>
-                  </a:rPr>
-                  <a:t>Verifier</a:t>
-                </a:r>
-              </a:p>
-            </p:txBody>
-          </p:sp>
-        </p:grpSp>
+            </a:ln>
+          </p:spPr>
+          <p:txBody>
+            <a:bodyPr wrap="none" rtlCol="0">
+              <a:spAutoFit/>
+            </a:bodyPr>
+            <a:lstStyle/>
+            <a:p>
+              <a:r>
+                <a:rPr lang="en-US" sz="2800" dirty="0">
+                  <a:latin typeface="Times New Roman" panose="02020603050405020304" pitchFamily="18" charset="0"/>
+                  <a:cs typeface="Times New Roman" panose="02020603050405020304" pitchFamily="18" charset="0"/>
+                </a:rPr>
+                <a:t>Tester</a:t>
+              </a:r>
+            </a:p>
+          </p:txBody>
+        </p:sp>
       </p:grpSp>
       <p:grpSp>
         <p:nvGrpSpPr>
@@ -4975,10 +4685,10 @@
         </p:nvGrpSpPr>
         <p:grpSpPr>
           <a:xfrm>
-            <a:off x="7233590" y="5904249"/>
-            <a:ext cx="1374694" cy="1230489"/>
-            <a:chOff x="6629494" y="6020569"/>
-            <a:chExt cx="1374694" cy="1230489"/>
+            <a:off x="7665582" y="6017299"/>
+            <a:ext cx="2142749" cy="1295404"/>
+            <a:chOff x="6629493" y="5955655"/>
+            <a:chExt cx="1693947" cy="1295404"/>
           </a:xfrm>
         </p:grpSpPr>
         <p:sp>
@@ -4995,14 +4705,14 @@
           </p:nvSpPr>
           <p:spPr>
             <a:xfrm>
-              <a:off x="6629494" y="6020569"/>
-              <a:ext cx="1374694" cy="1230489"/>
+              <a:off x="6629493" y="5955655"/>
+              <a:ext cx="1693947" cy="1295404"/>
             </a:xfrm>
             <a:prstGeom prst="flowChartDecision">
               <a:avLst/>
             </a:prstGeom>
             <a:noFill/>
-            <a:ln>
+            <a:ln w="38100">
               <a:solidFill>
                 <a:schemeClr val="tx1"/>
               </a:solidFill>
@@ -5052,142 +4762,40 @@
           </p:nvSpPr>
           <p:spPr>
             <a:xfrm>
-              <a:off x="6784079" y="6451147"/>
-              <a:ext cx="1069524" cy="369332"/>
+              <a:off x="6855521" y="6116204"/>
+              <a:ext cx="1247349" cy="830997"/>
             </a:xfrm>
             <a:prstGeom prst="rect">
               <a:avLst/>
             </a:prstGeom>
             <a:noFill/>
+            <a:ln w="38100">
+              <a:noFill/>
+            </a:ln>
           </p:spPr>
           <p:txBody>
-            <a:bodyPr wrap="none" rtlCol="0">
+            <a:bodyPr wrap="square" rtlCol="0">
               <a:spAutoFit/>
             </a:bodyPr>
             <a:lstStyle/>
             <a:p>
+              <a:pPr algn="ctr"/>
               <a:r>
-                <a:rPr lang="en-US" dirty="0">
+                <a:rPr lang="en-US" sz="2400" dirty="0">
                   <a:latin typeface="Times New Roman" panose="02020603050405020304" pitchFamily="18" charset="0"/>
                   <a:cs typeface="Times New Roman" panose="02020603050405020304" pitchFamily="18" charset="0"/>
                 </a:rPr>
-                <a:t>Genuine?</a:t>
+                <a:t>Is</a:t>
               </a:r>
             </a:p>
-          </p:txBody>
-        </p:sp>
-      </p:grpSp>
-      <p:grpSp>
-        <p:nvGrpSpPr>
-          <p:cNvPr id="141" name="Group 140">
-            <a:extLst>
-              <a:ext uri="{FF2B5EF4-FFF2-40B4-BE49-F238E27FC236}">
-                <a16:creationId xmlns:a16="http://schemas.microsoft.com/office/drawing/2014/main" id="{E9D32761-F701-2E47-80CC-1852658FC225}"/>
-              </a:ext>
-            </a:extLst>
-          </p:cNvPr>
-          <p:cNvGrpSpPr/>
-          <p:nvPr/>
-        </p:nvGrpSpPr>
-        <p:grpSpPr>
-          <a:xfrm>
-            <a:off x="14001535" y="5889474"/>
-            <a:ext cx="1374694" cy="1230489"/>
-            <a:chOff x="6629494" y="6020569"/>
-            <a:chExt cx="1374694" cy="1230489"/>
-          </a:xfrm>
-        </p:grpSpPr>
-        <p:sp>
-          <p:nvSpPr>
-            <p:cNvPr id="142" name="Decision 141">
-              <a:extLst>
-                <a:ext uri="{FF2B5EF4-FFF2-40B4-BE49-F238E27FC236}">
-                  <a16:creationId xmlns:a16="http://schemas.microsoft.com/office/drawing/2014/main" id="{95023043-21BD-6F41-AB41-A66DEB375120}"/>
-                </a:ext>
-              </a:extLst>
-            </p:cNvPr>
-            <p:cNvSpPr/>
-            <p:nvPr/>
-          </p:nvSpPr>
-          <p:spPr>
-            <a:xfrm>
-              <a:off x="6629494" y="6020569"/>
-              <a:ext cx="1374694" cy="1230489"/>
-            </a:xfrm>
-            <a:prstGeom prst="flowChartDecision">
-              <a:avLst/>
-            </a:prstGeom>
-            <a:noFill/>
-            <a:ln>
-              <a:solidFill>
-                <a:schemeClr val="tx1"/>
-              </a:solidFill>
-            </a:ln>
-          </p:spPr>
-          <p:style>
-            <a:lnRef idx="2">
-              <a:schemeClr val="accent1">
-                <a:shade val="50000"/>
-              </a:schemeClr>
-            </a:lnRef>
-            <a:fillRef idx="1">
-              <a:schemeClr val="accent1"/>
-            </a:fillRef>
-            <a:effectRef idx="0">
-              <a:schemeClr val="accent1"/>
-            </a:effectRef>
-            <a:fontRef idx="minor">
-              <a:schemeClr val="lt1"/>
-            </a:fontRef>
-          </p:style>
-          <p:txBody>
-            <a:bodyPr rot="0" spcFirstLastPara="0" vertOverflow="overflow" horzOverflow="overflow" vert="horz" wrap="square" lIns="91440" tIns="45720" rIns="91440" bIns="45720" numCol="1" spcCol="0" rtlCol="0" fromWordArt="0" anchor="ctr" anchorCtr="0" forceAA="0" compatLnSpc="1">
-              <a:prstTxWarp prst="textNoShape">
-                <a:avLst/>
-              </a:prstTxWarp>
-              <a:noAutofit/>
-            </a:bodyPr>
-            <a:lstStyle/>
             <a:p>
               <a:pPr algn="ctr"/>
-              <a:endParaRPr lang="en-US"/>
-            </a:p>
-          </p:txBody>
-        </p:sp>
-        <p:sp>
-          <p:nvSpPr>
-            <p:cNvPr id="143" name="TextBox 142">
-              <a:extLst>
-                <a:ext uri="{FF2B5EF4-FFF2-40B4-BE49-F238E27FC236}">
-                  <a16:creationId xmlns:a16="http://schemas.microsoft.com/office/drawing/2014/main" id="{A761B523-F3B0-7F44-817F-0C223F70E4A3}"/>
-                </a:ext>
-              </a:extLst>
-            </p:cNvPr>
-            <p:cNvSpPr txBox="1"/>
-            <p:nvPr/>
-          </p:nvSpPr>
-          <p:spPr>
-            <a:xfrm>
-              <a:off x="6961615" y="6461356"/>
-              <a:ext cx="710451" cy="369332"/>
-            </a:xfrm>
-            <a:prstGeom prst="rect">
-              <a:avLst/>
-            </a:prstGeom>
-            <a:noFill/>
-          </p:spPr>
-          <p:txBody>
-            <a:bodyPr wrap="none" rtlCol="0">
-              <a:spAutoFit/>
-            </a:bodyPr>
-            <a:lstStyle/>
-            <a:p>
               <a:r>
-                <a:rPr lang="en-US" dirty="0">
+                <a:rPr lang="en-US" sz="2400" dirty="0">
                   <a:latin typeface="Times New Roman" panose="02020603050405020304" pitchFamily="18" charset="0"/>
                   <a:cs typeface="Times New Roman" panose="02020603050405020304" pitchFamily="18" charset="0"/>
                 </a:rPr>
-                <a:t>Real?</a:t>
+                <a:t>imposter?</a:t>
               </a:r>
             </a:p>
           </p:txBody>
@@ -5207,7 +4815,7 @@
         </p:nvGrpSpPr>
         <p:grpSpPr>
           <a:xfrm>
-            <a:off x="16711724" y="3928997"/>
+            <a:off x="16722704" y="5217945"/>
             <a:ext cx="1196623" cy="1016000"/>
             <a:chOff x="16628533" y="5327895"/>
             <a:chExt cx="1196623" cy="1016000"/>
@@ -5234,7 +4842,7 @@
               <a:avLst/>
             </a:prstGeom>
             <a:noFill/>
-            <a:ln>
+            <a:ln w="38100">
               <a:solidFill>
                 <a:schemeClr val="tx1"/>
               </a:solidFill>
@@ -5279,13 +4887,16 @@
           </p:nvSpPr>
           <p:spPr>
             <a:xfrm>
-              <a:off x="16813621" y="5659878"/>
-              <a:ext cx="838691" cy="369332"/>
+              <a:off x="16699296" y="5602183"/>
+              <a:ext cx="1055097" cy="461665"/>
             </a:xfrm>
             <a:prstGeom prst="rect">
               <a:avLst/>
             </a:prstGeom>
             <a:noFill/>
+            <a:ln w="38100">
+              <a:noFill/>
+            </a:ln>
           </p:spPr>
           <p:txBody>
             <a:bodyPr wrap="none" rtlCol="0">
@@ -5294,7 +4905,7 @@
             <a:lstStyle/>
             <a:p>
               <a:r>
-                <a:rPr lang="en-US" dirty="0">
+                <a:rPr lang="en-US" sz="2400" dirty="0">
                   <a:latin typeface="Times New Roman" panose="02020603050405020304" pitchFamily="18" charset="0"/>
                   <a:cs typeface="Times New Roman" panose="02020603050405020304" pitchFamily="18" charset="0"/>
                 </a:rPr>
@@ -5318,7 +4929,7 @@
         </p:nvGrpSpPr>
         <p:grpSpPr>
           <a:xfrm>
-            <a:off x="16628533" y="7382474"/>
+            <a:off x="16722704" y="7447870"/>
             <a:ext cx="1196623" cy="1016000"/>
             <a:chOff x="16628533" y="5327895"/>
             <a:chExt cx="1196623" cy="1016000"/>
@@ -5345,7 +4956,7 @@
               <a:avLst/>
             </a:prstGeom>
             <a:noFill/>
-            <a:ln>
+            <a:ln w="38100">
               <a:solidFill>
                 <a:schemeClr val="tx1"/>
               </a:solidFill>
@@ -5390,13 +5001,16 @@
           </p:nvSpPr>
           <p:spPr>
             <a:xfrm>
-              <a:off x="16813621" y="5659878"/>
-              <a:ext cx="774571" cy="369332"/>
+              <a:off x="16742577" y="5605061"/>
+              <a:ext cx="968535" cy="461665"/>
             </a:xfrm>
             <a:prstGeom prst="rect">
               <a:avLst/>
             </a:prstGeom>
             <a:noFill/>
+            <a:ln w="38100">
+              <a:noFill/>
+            </a:ln>
           </p:spPr>
           <p:txBody>
             <a:bodyPr wrap="none" rtlCol="0">
@@ -5405,7 +5019,7 @@
             <a:lstStyle/>
             <a:p>
               <a:r>
-                <a:rPr lang="en-US" dirty="0">
+                <a:rPr lang="en-US" sz="2400" dirty="0">
                   <a:latin typeface="Times New Roman" panose="02020603050405020304" pitchFamily="18" charset="0"/>
                   <a:cs typeface="Times New Roman" panose="02020603050405020304" pitchFamily="18" charset="0"/>
                 </a:rPr>
@@ -5433,13 +5047,16 @@
         </p:nvCxnSpPr>
         <p:spPr>
           <a:xfrm flipV="1">
-            <a:off x="1228645" y="1842549"/>
-            <a:ext cx="2627240" cy="52014"/>
+            <a:off x="1947371" y="1842549"/>
+            <a:ext cx="2293522" cy="10733"/>
           </a:xfrm>
           <a:prstGeom prst="straightConnector1">
             <a:avLst/>
           </a:prstGeom>
-          <a:ln>
+          <a:ln w="22225">
+            <a:solidFill>
+              <a:schemeClr val="tx1"/>
+            </a:solidFill>
             <a:tailEnd type="triangle"/>
           </a:ln>
         </p:spPr>
@@ -5475,15 +5092,18 @@
         </p:nvCxnSpPr>
         <p:spPr>
           <a:xfrm rot="16200000" flipH="1">
-            <a:off x="1082530" y="2972473"/>
-            <a:ext cx="4144658" cy="1913049"/>
+            <a:off x="1426933" y="3013077"/>
+            <a:ext cx="4144658" cy="1831839"/>
           </a:xfrm>
           <a:prstGeom prst="bentConnector3">
             <a:avLst>
-              <a:gd name="adj1" fmla="val 73827"/>
+              <a:gd name="adj1" fmla="val 91802"/>
             </a:avLst>
           </a:prstGeom>
-          <a:ln>
+          <a:ln w="22225">
+            <a:solidFill>
+              <a:schemeClr val="tx1"/>
+            </a:solidFill>
             <a:tailEnd type="triangle"/>
           </a:ln>
         </p:spPr>
@@ -5520,13 +5140,16 @@
         </p:nvCxnSpPr>
         <p:spPr>
           <a:xfrm rot="16200000" flipH="1">
-            <a:off x="1729689" y="4753202"/>
-            <a:ext cx="1258923" cy="2253326"/>
+            <a:off x="2061055" y="5031698"/>
+            <a:ext cx="868323" cy="2426370"/>
           </a:xfrm>
           <a:prstGeom prst="bentConnector2">
             <a:avLst/>
           </a:prstGeom>
-          <a:ln>
+          <a:ln w="22225">
+            <a:solidFill>
+              <a:schemeClr val="tx1"/>
+            </a:solidFill>
             <a:tailEnd type="triangle"/>
           </a:ln>
         </p:spPr>
@@ -5555,6 +5178,7 @@
             </a:extLst>
           </p:cNvPr>
           <p:cNvCxnSpPr>
+            <a:cxnSpLocks/>
             <a:stCxn id="19" idx="3"/>
             <a:endCxn id="124" idx="2"/>
           </p:cNvCxnSpPr>
@@ -5562,13 +5186,16 @@
         </p:nvCxnSpPr>
         <p:spPr>
           <a:xfrm flipV="1">
-            <a:off x="1232486" y="7017327"/>
-            <a:ext cx="4605920" cy="1206270"/>
+            <a:off x="1771948" y="7356763"/>
+            <a:ext cx="4518718" cy="692374"/>
           </a:xfrm>
           <a:prstGeom prst="bentConnector2">
             <a:avLst/>
           </a:prstGeom>
-          <a:ln>
+          <a:ln w="22225">
+            <a:solidFill>
+              <a:schemeClr val="tx1"/>
+            </a:solidFill>
             <a:tailEnd type="triangle"/>
           </a:ln>
         </p:spPr>
@@ -5597,6 +5224,7 @@
             </a:extLst>
           </p:cNvPr>
           <p:cNvCxnSpPr>
+            <a:cxnSpLocks/>
             <a:stCxn id="123" idx="3"/>
             <a:endCxn id="124" idx="1"/>
           </p:cNvCxnSpPr>
@@ -5604,13 +5232,16 @@
         </p:nvCxnSpPr>
         <p:spPr>
           <a:xfrm>
-            <a:off x="4736954" y="6509327"/>
-            <a:ext cx="475881" cy="0"/>
+            <a:off x="5121963" y="6679045"/>
+            <a:ext cx="475880" cy="0"/>
           </a:xfrm>
           <a:prstGeom prst="straightConnector1">
             <a:avLst/>
           </a:prstGeom>
-          <a:ln>
+          <a:ln w="22225">
+            <a:solidFill>
+              <a:schemeClr val="tx1"/>
+            </a:solidFill>
             <a:tailEnd type="triangle"/>
           </a:ln>
         </p:spPr>
@@ -5639,20 +5270,24 @@
             </a:extLst>
           </p:cNvPr>
           <p:cNvCxnSpPr>
+            <a:cxnSpLocks/>
             <a:stCxn id="124" idx="3"/>
             <a:endCxn id="138" idx="1"/>
           </p:cNvCxnSpPr>
           <p:nvPr/>
         </p:nvCxnSpPr>
         <p:spPr>
-          <a:xfrm>
-            <a:off x="6463976" y="6509327"/>
-            <a:ext cx="769614" cy="10167"/>
+          <a:xfrm flipV="1">
+            <a:off x="6983489" y="6665001"/>
+            <a:ext cx="682093" cy="14044"/>
           </a:xfrm>
           <a:prstGeom prst="straightConnector1">
             <a:avLst/>
           </a:prstGeom>
-          <a:ln>
+          <a:ln w="22225">
+            <a:solidFill>
+              <a:schemeClr val="tx1"/>
+            </a:solidFill>
             <a:tailEnd type="triangle"/>
           </a:ln>
         </p:spPr>
@@ -5682,20 +5317,24 @@
           </p:cNvPr>
           <p:cNvCxnSpPr>
             <a:cxnSpLocks/>
+            <a:endCxn id="137" idx="1"/>
           </p:cNvCxnSpPr>
           <p:nvPr/>
         </p:nvCxnSpPr>
         <p:spPr>
           <a:xfrm>
-            <a:off x="2191736" y="3286817"/>
-            <a:ext cx="7703794" cy="2708595"/>
+            <a:off x="2560395" y="3274592"/>
+            <a:ext cx="9714254" cy="2029200"/>
           </a:xfrm>
           <a:prstGeom prst="bentConnector3">
             <a:avLst>
-              <a:gd name="adj1" fmla="val 100010"/>
+              <a:gd name="adj1" fmla="val 74850"/>
             </a:avLst>
           </a:prstGeom>
-          <a:ln>
+          <a:ln w="22225">
+            <a:solidFill>
+              <a:schemeClr val="tx1"/>
+            </a:solidFill>
             <a:tailEnd type="triangle"/>
           </a:ln>
         </p:spPr>
@@ -5730,14 +5369,17 @@
           <p:nvPr/>
         </p:nvCxnSpPr>
         <p:spPr>
-          <a:xfrm>
-            <a:off x="9841685" y="1842549"/>
-            <a:ext cx="1051751" cy="14120"/>
+          <a:xfrm flipV="1">
+            <a:off x="10226693" y="1815227"/>
+            <a:ext cx="1739035" cy="27322"/>
           </a:xfrm>
           <a:prstGeom prst="straightConnector1">
             <a:avLst/>
           </a:prstGeom>
-          <a:ln>
+          <a:ln w="22225">
+            <a:solidFill>
+              <a:schemeClr val="tx1"/>
+            </a:solidFill>
             <a:tailEnd type="triangle"/>
           </a:ln>
         </p:spPr>
@@ -5766,67 +5408,26 @@
             </a:extLst>
           </p:cNvPr>
           <p:cNvCxnSpPr>
+            <a:cxnSpLocks/>
             <a:stCxn id="40" idx="2"/>
             <a:endCxn id="136" idx="0"/>
           </p:cNvCxnSpPr>
           <p:nvPr/>
         </p:nvCxnSpPr>
         <p:spPr>
-          <a:xfrm rot="5400000">
-            <a:off x="9000528" y="3724945"/>
-            <a:ext cx="3420364" cy="1120572"/>
+          <a:xfrm rot="16200000" flipH="1">
+            <a:off x="11735330" y="3417224"/>
+            <a:ext cx="1997821" cy="622625"/>
           </a:xfrm>
           <a:prstGeom prst="bentConnector3">
             <a:avLst>
-              <a:gd name="adj1" fmla="val 20402"/>
+              <a:gd name="adj1" fmla="val 50000"/>
             </a:avLst>
           </a:prstGeom>
-          <a:ln>
-            <a:tailEnd type="triangle"/>
-          </a:ln>
-        </p:spPr>
-        <p:style>
-          <a:lnRef idx="1">
-            <a:schemeClr val="accent1"/>
-          </a:lnRef>
-          <a:fillRef idx="0">
-            <a:schemeClr val="accent1"/>
-          </a:fillRef>
-          <a:effectRef idx="0">
-            <a:schemeClr val="accent1"/>
-          </a:effectRef>
-          <a:fontRef idx="minor">
-            <a:schemeClr val="tx1"/>
-          </a:fontRef>
-        </p:style>
-      </p:cxnSp>
-      <p:cxnSp>
-        <p:nvCxnSpPr>
-          <p:cNvPr id="190" name="Elbow Connector 189">
-            <a:extLst>
-              <a:ext uri="{FF2B5EF4-FFF2-40B4-BE49-F238E27FC236}">
-                <a16:creationId xmlns:a16="http://schemas.microsoft.com/office/drawing/2014/main" id="{20804409-2F74-414D-8701-96A17FF02AC6}"/>
-              </a:ext>
-            </a:extLst>
-          </p:cNvPr>
-          <p:cNvCxnSpPr>
-            <a:stCxn id="138" idx="3"/>
-            <a:endCxn id="134" idx="2"/>
-          </p:cNvCxnSpPr>
-          <p:nvPr/>
-        </p:nvCxnSpPr>
-        <p:spPr>
-          <a:xfrm>
-            <a:off x="8608284" y="6519494"/>
-            <a:ext cx="3269162" cy="491919"/>
-          </a:xfrm>
-          <a:prstGeom prst="bentConnector4">
-            <a:avLst>
-              <a:gd name="adj1" fmla="val 10464"/>
-              <a:gd name="adj2" fmla="val 146471"/>
-            </a:avLst>
-          </a:prstGeom>
-          <a:ln>
+          <a:ln w="22225">
+            <a:solidFill>
+              <a:schemeClr val="tx1"/>
+            </a:solidFill>
             <a:tailEnd type="triangle"/>
           </a:ln>
         </p:spPr>
@@ -5855,146 +5456,24 @@
             </a:extLst>
           </p:cNvPr>
           <p:cNvCxnSpPr>
-            <a:stCxn id="136" idx="3"/>
-            <a:endCxn id="134" idx="1"/>
+            <a:cxnSpLocks/>
+            <a:stCxn id="136" idx="2"/>
+            <a:endCxn id="134" idx="0"/>
           </p:cNvCxnSpPr>
           <p:nvPr/>
         </p:nvCxnSpPr>
         <p:spPr>
-          <a:xfrm>
-            <a:off x="10775994" y="6503413"/>
-            <a:ext cx="475881" cy="0"/>
+          <a:xfrm flipH="1">
+            <a:off x="13032757" y="5892448"/>
+            <a:ext cx="12796" cy="252913"/>
           </a:xfrm>
           <a:prstGeom prst="straightConnector1">
             <a:avLst/>
           </a:prstGeom>
-          <a:ln>
-            <a:tailEnd type="triangle"/>
-          </a:ln>
-        </p:spPr>
-        <p:style>
-          <a:lnRef idx="1">
-            <a:schemeClr val="accent1"/>
-          </a:lnRef>
-          <a:fillRef idx="0">
-            <a:schemeClr val="accent1"/>
-          </a:fillRef>
-          <a:effectRef idx="0">
-            <a:schemeClr val="accent1"/>
-          </a:effectRef>
-          <a:fontRef idx="minor">
-            <a:schemeClr val="tx1"/>
-          </a:fontRef>
-        </p:style>
-      </p:cxnSp>
-      <p:cxnSp>
-        <p:nvCxnSpPr>
-          <p:cNvPr id="196" name="Straight Arrow Connector 195">
-            <a:extLst>
-              <a:ext uri="{FF2B5EF4-FFF2-40B4-BE49-F238E27FC236}">
-                <a16:creationId xmlns:a16="http://schemas.microsoft.com/office/drawing/2014/main" id="{834CABC4-2B30-AA4F-B474-D51F09AD54D8}"/>
-              </a:ext>
-            </a:extLst>
-          </p:cNvPr>
-          <p:cNvCxnSpPr>
-            <a:stCxn id="134" idx="3"/>
-            <a:endCxn id="142" idx="1"/>
-          </p:cNvCxnSpPr>
-          <p:nvPr/>
-        </p:nvCxnSpPr>
-        <p:spPr>
-          <a:xfrm>
-            <a:off x="12503016" y="6503413"/>
-            <a:ext cx="1498519" cy="1306"/>
-          </a:xfrm>
-          <a:prstGeom prst="straightConnector1">
-            <a:avLst/>
-          </a:prstGeom>
-          <a:ln>
-            <a:tailEnd type="triangle"/>
-          </a:ln>
-        </p:spPr>
-        <p:style>
-          <a:lnRef idx="1">
-            <a:schemeClr val="accent1"/>
-          </a:lnRef>
-          <a:fillRef idx="0">
-            <a:schemeClr val="accent1"/>
-          </a:fillRef>
-          <a:effectRef idx="0">
-            <a:schemeClr val="accent1"/>
-          </a:effectRef>
-          <a:fontRef idx="minor">
-            <a:schemeClr val="tx1"/>
-          </a:fontRef>
-        </p:style>
-      </p:cxnSp>
-      <p:cxnSp>
-        <p:nvCxnSpPr>
-          <p:cNvPr id="200" name="Elbow Connector 199">
-            <a:extLst>
-              <a:ext uri="{FF2B5EF4-FFF2-40B4-BE49-F238E27FC236}">
-                <a16:creationId xmlns:a16="http://schemas.microsoft.com/office/drawing/2014/main" id="{3F2C6261-31FA-9F49-B096-55764A95F5C8}"/>
-              </a:ext>
-            </a:extLst>
-          </p:cNvPr>
-          <p:cNvCxnSpPr>
-            <a:stCxn id="138" idx="2"/>
-            <a:endCxn id="148" idx="1"/>
-          </p:cNvCxnSpPr>
-          <p:nvPr/>
-        </p:nvCxnSpPr>
-        <p:spPr>
-          <a:xfrm rot="16200000" flipH="1">
-            <a:off x="11896867" y="3158808"/>
-            <a:ext cx="755736" cy="8707596"/>
-          </a:xfrm>
-          <a:prstGeom prst="bentConnector2">
-            <a:avLst/>
-          </a:prstGeom>
-          <a:ln>
-            <a:tailEnd type="triangle"/>
-          </a:ln>
-        </p:spPr>
-        <p:style>
-          <a:lnRef idx="1">
-            <a:schemeClr val="accent1"/>
-          </a:lnRef>
-          <a:fillRef idx="0">
-            <a:schemeClr val="accent1"/>
-          </a:fillRef>
-          <a:effectRef idx="0">
-            <a:schemeClr val="accent1"/>
-          </a:effectRef>
-          <a:fontRef idx="minor">
-            <a:schemeClr val="tx1"/>
-          </a:fontRef>
-        </p:style>
-      </p:cxnSp>
-      <p:cxnSp>
-        <p:nvCxnSpPr>
-          <p:cNvPr id="202" name="Elbow Connector 201">
-            <a:extLst>
-              <a:ext uri="{FF2B5EF4-FFF2-40B4-BE49-F238E27FC236}">
-                <a16:creationId xmlns:a16="http://schemas.microsoft.com/office/drawing/2014/main" id="{C0B0BC7A-69F1-6C4D-BDFB-1161627B2B7E}"/>
-              </a:ext>
-            </a:extLst>
-          </p:cNvPr>
-          <p:cNvCxnSpPr>
-            <a:stCxn id="142" idx="2"/>
-            <a:endCxn id="148" idx="1"/>
-          </p:cNvCxnSpPr>
-          <p:nvPr/>
-        </p:nvCxnSpPr>
-        <p:spPr>
-          <a:xfrm rot="16200000" flipH="1">
-            <a:off x="15273452" y="6535392"/>
-            <a:ext cx="770511" cy="1939651"/>
-          </a:xfrm>
-          <a:prstGeom prst="bentConnector2">
-            <a:avLst/>
-          </a:prstGeom>
-          <a:ln>
+          <a:ln w="22225">
+            <a:solidFill>
+              <a:schemeClr val="tx1"/>
+            </a:solidFill>
             <a:tailEnd type="triangle"/>
           </a:ln>
         </p:spPr>
@@ -6027,7 +5506,7 @@
         </p:nvGrpSpPr>
         <p:grpSpPr>
           <a:xfrm>
-            <a:off x="581976" y="4155766"/>
+            <a:off x="631520" y="4716084"/>
             <a:ext cx="1345292" cy="1172129"/>
             <a:chOff x="581976" y="4155766"/>
             <a:chExt cx="1345292" cy="1172129"/>
@@ -6161,8 +5640,8 @@
         </p:nvSpPr>
         <p:spPr>
           <a:xfrm>
-            <a:off x="104134" y="2886327"/>
-            <a:ext cx="1508683" cy="646331"/>
+            <a:off x="-11926" y="1345841"/>
+            <a:ext cx="1024639" cy="923330"/>
           </a:xfrm>
           <a:prstGeom prst="rect">
             <a:avLst/>
@@ -6175,6 +5654,7 @@
           </a:bodyPr>
           <a:lstStyle/>
           <a:p>
+            <a:pPr algn="ctr"/>
             <a:r>
               <a:rPr lang="en-US" dirty="0">
                 <a:latin typeface="Times New Roman" panose="02020603050405020304" pitchFamily="18" charset="0"/>
@@ -6184,12 +5664,23 @@
             </a:r>
           </a:p>
           <a:p>
+            <a:pPr algn="ctr"/>
             <a:r>
               <a:rPr lang="en-US" dirty="0">
                 <a:latin typeface="Times New Roman" panose="02020603050405020304" pitchFamily="18" charset="0"/>
                 <a:cs typeface="Times New Roman" panose="02020603050405020304" pitchFamily="18" charset="0"/>
               </a:rPr>
-              <a:t>Touch Strokes</a:t>
+              <a:t>Touch </a:t>
+            </a:r>
+          </a:p>
+          <a:p>
+            <a:pPr algn="ctr"/>
+            <a:r>
+              <a:rPr lang="en-US" dirty="0">
+                <a:latin typeface="Times New Roman" panose="02020603050405020304" pitchFamily="18" charset="0"/>
+                <a:cs typeface="Times New Roman" panose="02020603050405020304" pitchFamily="18" charset="0"/>
+              </a:rPr>
+              <a:t>Strokes</a:t>
             </a:r>
           </a:p>
         </p:txBody>
@@ -6208,8 +5699,8 @@
         </p:nvSpPr>
         <p:spPr>
           <a:xfrm>
-            <a:off x="10539507" y="452907"/>
-            <a:ext cx="1508683" cy="646331"/>
+            <a:off x="12990887" y="1355994"/>
+            <a:ext cx="877163" cy="923330"/>
           </a:xfrm>
           <a:prstGeom prst="rect">
             <a:avLst/>
@@ -6222,6 +5713,7 @@
           </a:bodyPr>
           <a:lstStyle/>
           <a:p>
+            <a:pPr algn="ctr"/>
             <a:r>
               <a:rPr lang="en-US" dirty="0">
                 <a:latin typeface="Times New Roman" panose="02020603050405020304" pitchFamily="18" charset="0"/>
@@ -6231,12 +5723,23 @@
             </a:r>
           </a:p>
           <a:p>
+            <a:pPr algn="ctr"/>
             <a:r>
               <a:rPr lang="en-US" dirty="0">
                 <a:latin typeface="Times New Roman" panose="02020603050405020304" pitchFamily="18" charset="0"/>
                 <a:cs typeface="Times New Roman" panose="02020603050405020304" pitchFamily="18" charset="0"/>
               </a:rPr>
-              <a:t>Touch Strokes</a:t>
+              <a:t>Touch </a:t>
+            </a:r>
+          </a:p>
+          <a:p>
+            <a:pPr algn="ctr"/>
+            <a:r>
+              <a:rPr lang="en-US" dirty="0">
+                <a:latin typeface="Times New Roman" panose="02020603050405020304" pitchFamily="18" charset="0"/>
+                <a:cs typeface="Times New Roman" panose="02020603050405020304" pitchFamily="18" charset="0"/>
+              </a:rPr>
+              <a:t>Strokes</a:t>
             </a:r>
           </a:p>
         </p:txBody>
@@ -6255,8 +5758,8 @@
         </p:nvSpPr>
         <p:spPr>
           <a:xfrm>
-            <a:off x="398070" y="6836161"/>
-            <a:ext cx="1475469" cy="646331"/>
+            <a:off x="13168" y="7542311"/>
+            <a:ext cx="877163" cy="923330"/>
           </a:xfrm>
           <a:prstGeom prst="rect">
             <a:avLst/>
@@ -6269,15 +5772,33 @@
           </a:bodyPr>
           <a:lstStyle/>
           <a:p>
-            <a:r>
-              <a:rPr lang="en-US" dirty="0"/>
+            <a:pPr algn="ctr"/>
+            <a:r>
+              <a:rPr lang="en-US" dirty="0">
+                <a:latin typeface="Times New Roman" panose="02020603050405020304" pitchFamily="18" charset="0"/>
+                <a:cs typeface="Times New Roman" panose="02020603050405020304" pitchFamily="18" charset="0"/>
+              </a:rPr>
               <a:t>Test</a:t>
             </a:r>
           </a:p>
           <a:p>
-            <a:r>
-              <a:rPr lang="en-US" dirty="0"/>
-              <a:t>Touch Strokes</a:t>
+            <a:pPr algn="ctr"/>
+            <a:r>
+              <a:rPr lang="en-US" dirty="0">
+                <a:latin typeface="Times New Roman" panose="02020603050405020304" pitchFamily="18" charset="0"/>
+                <a:cs typeface="Times New Roman" panose="02020603050405020304" pitchFamily="18" charset="0"/>
+              </a:rPr>
+              <a:t>Touch </a:t>
+            </a:r>
+          </a:p>
+          <a:p>
+            <a:pPr algn="ctr"/>
+            <a:r>
+              <a:rPr lang="en-US" dirty="0">
+                <a:latin typeface="Times New Roman" panose="02020603050405020304" pitchFamily="18" charset="0"/>
+                <a:cs typeface="Times New Roman" panose="02020603050405020304" pitchFamily="18" charset="0"/>
+              </a:rPr>
+              <a:t>Strokes</a:t>
             </a:r>
           </a:p>
         </p:txBody>
@@ -6296,7 +5817,7 @@
         </p:nvSpPr>
         <p:spPr>
           <a:xfrm>
-            <a:off x="4081126" y="3977257"/>
+            <a:off x="3197183" y="3991534"/>
             <a:ext cx="5634684" cy="584775"/>
           </a:xfrm>
           <a:prstGeom prst="rect">
@@ -6336,7 +5857,7 @@
         </p:nvSpPr>
         <p:spPr>
           <a:xfrm>
-            <a:off x="4524362" y="5277510"/>
+            <a:off x="4909370" y="5101048"/>
             <a:ext cx="2300502" cy="646331"/>
           </a:xfrm>
           <a:prstGeom prst="rect">
@@ -6352,43 +5873,473 @@
           </a:bodyPr>
           <a:lstStyle/>
           <a:p>
-            <a:r>
-              <a:rPr lang="en-US" dirty="0"/>
-              <a:t>Naïve Touch-Based </a:t>
-            </a:r>
-          </a:p>
-          <a:p>
-            <a:r>
-              <a:rPr lang="en-US" dirty="0"/>
+            <a:pPr algn="ctr"/>
+            <a:r>
+              <a:rPr lang="en-US" dirty="0">
+                <a:latin typeface="Times New Roman" panose="02020603050405020304" pitchFamily="18" charset="0"/>
+                <a:cs typeface="Times New Roman" panose="02020603050405020304" pitchFamily="18" charset="0"/>
+              </a:rPr>
+              <a:t>Naive Touch-Based </a:t>
+            </a:r>
+          </a:p>
+          <a:p>
+            <a:pPr algn="ctr"/>
+            <a:r>
+              <a:rPr lang="en-US" dirty="0">
+                <a:latin typeface="Times New Roman" panose="02020603050405020304" pitchFamily="18" charset="0"/>
+                <a:cs typeface="Times New Roman" panose="02020603050405020304" pitchFamily="18" charset="0"/>
+              </a:rPr>
               <a:t>Authentication System</a:t>
+            </a:r>
+          </a:p>
+        </p:txBody>
+      </p:sp>
+      <p:grpSp>
+        <p:nvGrpSpPr>
+          <p:cNvPr id="27" name="Group 26">
+            <a:extLst>
+              <a:ext uri="{FF2B5EF4-FFF2-40B4-BE49-F238E27FC236}">
+                <a16:creationId xmlns:a16="http://schemas.microsoft.com/office/drawing/2014/main" id="{C048824E-0DA6-9A41-8FE6-EFC0AE9AAEA2}"/>
+              </a:ext>
+            </a:extLst>
+          </p:cNvPr>
+          <p:cNvGrpSpPr/>
+          <p:nvPr/>
+        </p:nvGrpSpPr>
+        <p:grpSpPr>
+          <a:xfrm>
+            <a:off x="857548" y="7134737"/>
+            <a:ext cx="914400" cy="1828800"/>
+            <a:chOff x="477366" y="7505217"/>
+            <a:chExt cx="755120" cy="1436760"/>
+          </a:xfrm>
+        </p:grpSpPr>
+        <p:grpSp>
+          <p:nvGrpSpPr>
+            <p:cNvPr id="38" name="Group 37">
+              <a:extLst>
+                <a:ext uri="{FF2B5EF4-FFF2-40B4-BE49-F238E27FC236}">
+                  <a16:creationId xmlns:a16="http://schemas.microsoft.com/office/drawing/2014/main" id="{9456CC99-059C-084F-BA09-DEEE6C2E0972}"/>
+                </a:ext>
+              </a:extLst>
+            </p:cNvPr>
+            <p:cNvGrpSpPr/>
+            <p:nvPr/>
+          </p:nvGrpSpPr>
+          <p:grpSpPr>
+            <a:xfrm>
+              <a:off x="477366" y="7505217"/>
+              <a:ext cx="755120" cy="1436760"/>
+              <a:chOff x="2307772" y="1328057"/>
+              <a:chExt cx="671218" cy="1277120"/>
+            </a:xfrm>
+          </p:grpSpPr>
+          <p:sp>
+            <p:nvSpPr>
+              <p:cNvPr id="19" name="Rounded Rectangle 18">
+                <a:extLst>
+                  <a:ext uri="{FF2B5EF4-FFF2-40B4-BE49-F238E27FC236}">
+                    <a16:creationId xmlns:a16="http://schemas.microsoft.com/office/drawing/2014/main" id="{908863B3-71E1-9549-BCB3-85B7EA66232B}"/>
+                  </a:ext>
+                </a:extLst>
+              </p:cNvPr>
+              <p:cNvSpPr/>
+              <p:nvPr/>
+            </p:nvSpPr>
+            <p:spPr>
+              <a:xfrm>
+                <a:off x="2307772" y="1328057"/>
+                <a:ext cx="671218" cy="1277120"/>
+              </a:xfrm>
+              <a:prstGeom prst="roundRect">
+                <a:avLst/>
+              </a:prstGeom>
+              <a:ln>
+                <a:solidFill>
+                  <a:schemeClr val="tx1"/>
+                </a:solidFill>
+              </a:ln>
+            </p:spPr>
+            <p:style>
+              <a:lnRef idx="2">
+                <a:schemeClr val="accent3"/>
+              </a:lnRef>
+              <a:fillRef idx="1">
+                <a:schemeClr val="lt1"/>
+              </a:fillRef>
+              <a:effectRef idx="0">
+                <a:schemeClr val="accent3"/>
+              </a:effectRef>
+              <a:fontRef idx="minor">
+                <a:schemeClr val="dk1"/>
+              </a:fontRef>
+            </p:style>
+            <p:txBody>
+              <a:bodyPr rot="0" spcFirstLastPara="0" vertOverflow="overflow" horzOverflow="overflow" vert="horz" wrap="square" lIns="102870" tIns="51435" rIns="102870" bIns="51435" numCol="1" spcCol="0" rtlCol="0" fromWordArt="0" anchor="ctr" anchorCtr="0" forceAA="0" compatLnSpc="1">
+                <a:prstTxWarp prst="textNoShape">
+                  <a:avLst/>
+                </a:prstTxWarp>
+                <a:noAutofit/>
+              </a:bodyPr>
+              <a:lstStyle/>
+              <a:p>
+                <a:pPr algn="ctr"/>
+                <a:endParaRPr lang="en-US" sz="2430"/>
+              </a:p>
+            </p:txBody>
+          </p:sp>
+          <p:sp>
+            <p:nvSpPr>
+              <p:cNvPr id="20" name="Rectangle 19">
+                <a:extLst>
+                  <a:ext uri="{FF2B5EF4-FFF2-40B4-BE49-F238E27FC236}">
+                    <a16:creationId xmlns:a16="http://schemas.microsoft.com/office/drawing/2014/main" id="{D742027B-D684-A04F-90D3-46BC6338F50D}"/>
+                  </a:ext>
+                </a:extLst>
+              </p:cNvPr>
+              <p:cNvSpPr/>
+              <p:nvPr/>
+            </p:nvSpPr>
+            <p:spPr>
+              <a:xfrm>
+                <a:off x="2329132" y="1437736"/>
+                <a:ext cx="626853" cy="1040921"/>
+              </a:xfrm>
+              <a:prstGeom prst="rect">
+                <a:avLst/>
+              </a:prstGeom>
+              <a:noFill/>
+              <a:ln>
+                <a:solidFill>
+                  <a:schemeClr val="tx1"/>
+                </a:solidFill>
+              </a:ln>
+            </p:spPr>
+            <p:style>
+              <a:lnRef idx="2">
+                <a:schemeClr val="accent1">
+                  <a:shade val="50000"/>
+                </a:schemeClr>
+              </a:lnRef>
+              <a:fillRef idx="1">
+                <a:schemeClr val="accent1"/>
+              </a:fillRef>
+              <a:effectRef idx="0">
+                <a:schemeClr val="accent1"/>
+              </a:effectRef>
+              <a:fontRef idx="minor">
+                <a:schemeClr val="lt1"/>
+              </a:fontRef>
+            </p:style>
+            <p:txBody>
+              <a:bodyPr rot="0" spcFirstLastPara="0" vertOverflow="overflow" horzOverflow="overflow" vert="horz" wrap="square" lIns="102870" tIns="51435" rIns="102870" bIns="51435" numCol="1" spcCol="0" rtlCol="0" fromWordArt="0" anchor="ctr" anchorCtr="0" forceAA="0" compatLnSpc="1">
+                <a:prstTxWarp prst="textNoShape">
+                  <a:avLst/>
+                </a:prstTxWarp>
+                <a:noAutofit/>
+              </a:bodyPr>
+              <a:lstStyle/>
+              <a:p>
+                <a:pPr algn="ctr"/>
+                <a:endParaRPr lang="en-US" sz="2430"/>
+              </a:p>
+            </p:txBody>
+          </p:sp>
+          <p:sp>
+            <p:nvSpPr>
+              <p:cNvPr id="21" name="Rounded Rectangle 20">
+                <a:extLst>
+                  <a:ext uri="{FF2B5EF4-FFF2-40B4-BE49-F238E27FC236}">
+                    <a16:creationId xmlns:a16="http://schemas.microsoft.com/office/drawing/2014/main" id="{9B586CC1-A84B-D44E-AE72-329CD6185AAB}"/>
+                  </a:ext>
+                </a:extLst>
+              </p:cNvPr>
+              <p:cNvSpPr/>
+              <p:nvPr/>
+            </p:nvSpPr>
+            <p:spPr>
+              <a:xfrm>
+                <a:off x="2536195" y="2519057"/>
+                <a:ext cx="212725" cy="45719"/>
+              </a:xfrm>
+              <a:prstGeom prst="roundRect">
+                <a:avLst/>
+              </a:prstGeom>
+              <a:ln>
+                <a:solidFill>
+                  <a:schemeClr val="tx1"/>
+                </a:solidFill>
+              </a:ln>
+            </p:spPr>
+            <p:style>
+              <a:lnRef idx="2">
+                <a:schemeClr val="accent6"/>
+              </a:lnRef>
+              <a:fillRef idx="1">
+                <a:schemeClr val="lt1"/>
+              </a:fillRef>
+              <a:effectRef idx="0">
+                <a:schemeClr val="accent6"/>
+              </a:effectRef>
+              <a:fontRef idx="minor">
+                <a:schemeClr val="dk1"/>
+              </a:fontRef>
+            </p:style>
+            <p:txBody>
+              <a:bodyPr rot="0" spcFirstLastPara="0" vertOverflow="overflow" horzOverflow="overflow" vert="horz" wrap="square" lIns="102870" tIns="51435" rIns="102870" bIns="51435" numCol="1" spcCol="0" rtlCol="0" fromWordArt="0" anchor="ctr" anchorCtr="0" forceAA="0" compatLnSpc="1">
+                <a:prstTxWarp prst="textNoShape">
+                  <a:avLst/>
+                </a:prstTxWarp>
+                <a:noAutofit/>
+              </a:bodyPr>
+              <a:lstStyle/>
+              <a:p>
+                <a:pPr algn="ctr"/>
+                <a:endParaRPr lang="en-US" sz="2430"/>
+              </a:p>
+            </p:txBody>
+          </p:sp>
+        </p:grpSp>
+        <mc:AlternateContent xmlns:mc="http://schemas.openxmlformats.org/markup-compatibility/2006">
+          <mc:Choice xmlns:p14="http://schemas.microsoft.com/office/powerpoint/2010/main" Requires="p14">
+            <p:contentPart p14:bwMode="auto" r:id="rId8">
+              <p14:nvContentPartPr>
+                <p14:cNvPr id="26" name="Ink 25">
+                  <a:extLst>
+                    <a:ext uri="{FF2B5EF4-FFF2-40B4-BE49-F238E27FC236}">
+                      <a16:creationId xmlns:a16="http://schemas.microsoft.com/office/drawing/2014/main" id="{95B4D893-AC32-A642-A52E-4FD4D5C038E1}"/>
+                    </a:ext>
+                  </a:extLst>
+                </p14:cNvPr>
+                <p14:cNvContentPartPr/>
+                <p14:nvPr/>
+              </p14:nvContentPartPr>
+              <p14:xfrm>
+                <a:off x="650642" y="7973312"/>
+                <a:ext cx="431830" cy="576112"/>
+              </p14:xfrm>
+            </p:contentPart>
+          </mc:Choice>
+          <mc:Fallback>
+            <p:pic>
+              <p:nvPicPr>
+                <p:cNvPr id="26" name="Ink 25">
+                  <a:extLst>
+                    <a:ext uri="{FF2B5EF4-FFF2-40B4-BE49-F238E27FC236}">
+                      <a16:creationId xmlns:a16="http://schemas.microsoft.com/office/drawing/2014/main" id="{95B4D893-AC32-A642-A52E-4FD4D5C038E1}"/>
+                    </a:ext>
+                  </a:extLst>
+                </p:cNvPr>
+                <p:cNvPicPr/>
+                <p:nvPr/>
+              </p:nvPicPr>
+              <p:blipFill>
+                <a:blip r:embed="rId9"/>
+                <a:stretch>
+                  <a:fillRect/>
+                </a:stretch>
+              </p:blipFill>
+              <p:spPr>
+                <a:xfrm>
+                  <a:off x="640537" y="7963408"/>
+                  <a:ext cx="452634" cy="595919"/>
+                </a:xfrm>
+                <a:prstGeom prst="rect">
+                  <a:avLst/>
+                </a:prstGeom>
+              </p:spPr>
+            </p:pic>
+          </mc:Fallback>
+        </mc:AlternateContent>
+      </p:grpSp>
+      <p:sp>
+        <p:nvSpPr>
+          <p:cNvPr id="81" name="TextBox 80">
+            <a:extLst>
+              <a:ext uri="{FF2B5EF4-FFF2-40B4-BE49-F238E27FC236}">
+                <a16:creationId xmlns:a16="http://schemas.microsoft.com/office/drawing/2014/main" id="{77502858-3D02-F044-B31D-4461693A64A4}"/>
+              </a:ext>
+            </a:extLst>
+          </p:cNvPr>
+          <p:cNvSpPr txBox="1"/>
+          <p:nvPr/>
+        </p:nvSpPr>
+        <p:spPr>
+          <a:xfrm>
+            <a:off x="10497401" y="4296604"/>
+            <a:ext cx="1819730" cy="646331"/>
+          </a:xfrm>
+          <a:prstGeom prst="rect">
+            <a:avLst/>
+          </a:prstGeom>
+          <a:solidFill>
+            <a:schemeClr val="bg2"/>
+          </a:solidFill>
+        </p:spPr>
+        <p:txBody>
+          <a:bodyPr wrap="none" rtlCol="0">
+            <a:spAutoFit/>
+          </a:bodyPr>
+          <a:lstStyle/>
+          <a:p>
+            <a:pPr algn="ctr"/>
+            <a:r>
+              <a:rPr lang="en-US" dirty="0">
+                <a:latin typeface="Times New Roman" panose="02020603050405020304" pitchFamily="18" charset="0"/>
+                <a:cs typeface="Times New Roman" panose="02020603050405020304" pitchFamily="18" charset="0"/>
+              </a:rPr>
+              <a:t>Fake Sample</a:t>
+            </a:r>
+          </a:p>
+          <a:p>
+            <a:pPr algn="ctr"/>
+            <a:r>
+              <a:rPr lang="en-US" dirty="0">
+                <a:latin typeface="Times New Roman" panose="02020603050405020304" pitchFamily="18" charset="0"/>
+                <a:cs typeface="Times New Roman" panose="02020603050405020304" pitchFamily="18" charset="0"/>
+              </a:rPr>
+              <a:t>Detection System</a:t>
+            </a:r>
+          </a:p>
+        </p:txBody>
+      </p:sp>
+      <p:sp>
+        <p:nvSpPr>
+          <p:cNvPr id="82" name="Round Diagonal Corner Rectangle 81">
+            <a:extLst>
+              <a:ext uri="{FF2B5EF4-FFF2-40B4-BE49-F238E27FC236}">
+                <a16:creationId xmlns:a16="http://schemas.microsoft.com/office/drawing/2014/main" id="{A1F98541-391A-E245-9511-2BBD4E74BBC7}"/>
+              </a:ext>
+            </a:extLst>
+          </p:cNvPr>
+          <p:cNvSpPr/>
+          <p:nvPr/>
+        </p:nvSpPr>
+        <p:spPr>
+          <a:xfrm>
+            <a:off x="15135726" y="5360333"/>
+            <a:ext cx="1177554" cy="772597"/>
+          </a:xfrm>
+          <a:prstGeom prst="round2DiagRect">
+            <a:avLst/>
+          </a:prstGeom>
+          <a:ln w="38100">
+            <a:solidFill>
+              <a:schemeClr val="tx1"/>
+            </a:solidFill>
+          </a:ln>
+        </p:spPr>
+        <p:style>
+          <a:lnRef idx="2">
+            <a:schemeClr val="accent6"/>
+          </a:lnRef>
+          <a:fillRef idx="1">
+            <a:schemeClr val="lt1"/>
+          </a:fillRef>
+          <a:effectRef idx="0">
+            <a:schemeClr val="accent6"/>
+          </a:effectRef>
+          <a:fontRef idx="minor">
+            <a:schemeClr val="dk1"/>
+          </a:fontRef>
+        </p:style>
+        <p:txBody>
+          <a:bodyPr rtlCol="0" anchor="ctr"/>
+          <a:lstStyle/>
+          <a:p>
+            <a:pPr algn="ctr"/>
+            <a:r>
+              <a:rPr lang="en-US" sz="2000" dirty="0">
+                <a:latin typeface="Times New Roman" panose="02020603050405020304" pitchFamily="18" charset="0"/>
+                <a:cs typeface="Times New Roman" panose="02020603050405020304" pitchFamily="18" charset="0"/>
+              </a:rPr>
+              <a:t>Genuine</a:t>
+            </a:r>
+          </a:p>
+        </p:txBody>
+      </p:sp>
+      <p:sp>
+        <p:nvSpPr>
+          <p:cNvPr id="155" name="Round Diagonal Corner Rectangle 154">
+            <a:extLst>
+              <a:ext uri="{FF2B5EF4-FFF2-40B4-BE49-F238E27FC236}">
+                <a16:creationId xmlns:a16="http://schemas.microsoft.com/office/drawing/2014/main" id="{9678B920-7515-9540-AD27-43CB28C09AFE}"/>
+              </a:ext>
+            </a:extLst>
+          </p:cNvPr>
+          <p:cNvSpPr/>
+          <p:nvPr/>
+        </p:nvSpPr>
+        <p:spPr>
+          <a:xfrm>
+            <a:off x="15134844" y="7584138"/>
+            <a:ext cx="1177553" cy="772597"/>
+          </a:xfrm>
+          <a:prstGeom prst="round2DiagRect">
+            <a:avLst/>
+          </a:prstGeom>
+          <a:ln w="38100">
+            <a:solidFill>
+              <a:schemeClr val="tx1"/>
+            </a:solidFill>
+          </a:ln>
+        </p:spPr>
+        <p:style>
+          <a:lnRef idx="2">
+            <a:schemeClr val="accent6"/>
+          </a:lnRef>
+          <a:fillRef idx="1">
+            <a:schemeClr val="lt1"/>
+          </a:fillRef>
+          <a:effectRef idx="0">
+            <a:schemeClr val="accent6"/>
+          </a:effectRef>
+          <a:fontRef idx="minor">
+            <a:schemeClr val="dk1"/>
+          </a:fontRef>
+        </p:style>
+        <p:txBody>
+          <a:bodyPr rtlCol="0" anchor="ctr"/>
+          <a:lstStyle/>
+          <a:p>
+            <a:pPr algn="ctr"/>
+            <a:r>
+              <a:rPr lang="en-US" sz="2000" dirty="0">
+                <a:latin typeface="Times New Roman" panose="02020603050405020304" pitchFamily="18" charset="0"/>
+                <a:cs typeface="Times New Roman" panose="02020603050405020304" pitchFamily="18" charset="0"/>
+              </a:rPr>
+              <a:t>Imposter</a:t>
             </a:r>
           </a:p>
         </p:txBody>
       </p:sp>
       <p:cxnSp>
         <p:nvCxnSpPr>
-          <p:cNvPr id="226" name="Elbow Connector 225">
+          <p:cNvPr id="89" name="Elbow Connector 88">
             <a:extLst>
               <a:ext uri="{FF2B5EF4-FFF2-40B4-BE49-F238E27FC236}">
-                <a16:creationId xmlns:a16="http://schemas.microsoft.com/office/drawing/2014/main" id="{4352C80C-D89E-0B45-84F5-F880D1FB1B84}"/>
+                <a16:creationId xmlns:a16="http://schemas.microsoft.com/office/drawing/2014/main" id="{C36497FB-1163-7E4C-82A5-420D9683D085}"/>
               </a:ext>
             </a:extLst>
           </p:cNvPr>
           <p:cNvCxnSpPr>
-            <a:stCxn id="142" idx="0"/>
-            <a:endCxn id="144" idx="1"/>
+            <a:stCxn id="138" idx="2"/>
+            <a:endCxn id="155" idx="2"/>
           </p:cNvCxnSpPr>
           <p:nvPr/>
         </p:nvCxnSpPr>
         <p:spPr>
-          <a:xfrm rot="5400000" flipH="1" flipV="1">
-            <a:off x="14974065" y="4151815"/>
-            <a:ext cx="1452477" cy="2022842"/>
+          <a:xfrm rot="16200000" flipH="1">
+            <a:off x="11607033" y="4442626"/>
+            <a:ext cx="657734" cy="6397887"/>
           </a:xfrm>
           <a:prstGeom prst="bentConnector2">
             <a:avLst/>
           </a:prstGeom>
-          <a:ln>
+          <a:ln w="22225">
+            <a:solidFill>
+              <a:schemeClr val="tx1"/>
+            </a:solidFill>
             <a:tailEnd type="triangle"/>
           </a:ln>
         </p:spPr>
@@ -6407,6 +6358,310 @@
           </a:fontRef>
         </p:style>
       </p:cxnSp>
+      <p:cxnSp>
+        <p:nvCxnSpPr>
+          <p:cNvPr id="91" name="Elbow Connector 90">
+            <a:extLst>
+              <a:ext uri="{FF2B5EF4-FFF2-40B4-BE49-F238E27FC236}">
+                <a16:creationId xmlns:a16="http://schemas.microsoft.com/office/drawing/2014/main" id="{B65C0FCD-341E-184A-97BA-9A35907DBC61}"/>
+              </a:ext>
+            </a:extLst>
+          </p:cNvPr>
+          <p:cNvCxnSpPr>
+            <a:stCxn id="134" idx="3"/>
+            <a:endCxn id="82" idx="2"/>
+          </p:cNvCxnSpPr>
+          <p:nvPr/>
+        </p:nvCxnSpPr>
+        <p:spPr>
+          <a:xfrm flipV="1">
+            <a:off x="13801402" y="5746632"/>
+            <a:ext cx="1334324" cy="928561"/>
+          </a:xfrm>
+          <a:prstGeom prst="bentConnector3">
+            <a:avLst>
+              <a:gd name="adj1" fmla="val 74842"/>
+            </a:avLst>
+          </a:prstGeom>
+          <a:ln w="22225">
+            <a:solidFill>
+              <a:schemeClr val="tx1"/>
+            </a:solidFill>
+            <a:tailEnd type="triangle"/>
+          </a:ln>
+        </p:spPr>
+        <p:style>
+          <a:lnRef idx="1">
+            <a:schemeClr val="accent1"/>
+          </a:lnRef>
+          <a:fillRef idx="0">
+            <a:schemeClr val="accent1"/>
+          </a:fillRef>
+          <a:effectRef idx="0">
+            <a:schemeClr val="accent1"/>
+          </a:effectRef>
+          <a:fontRef idx="minor">
+            <a:schemeClr val="tx1"/>
+          </a:fontRef>
+        </p:style>
+      </p:cxnSp>
+      <p:cxnSp>
+        <p:nvCxnSpPr>
+          <p:cNvPr id="93" name="Elbow Connector 92">
+            <a:extLst>
+              <a:ext uri="{FF2B5EF4-FFF2-40B4-BE49-F238E27FC236}">
+                <a16:creationId xmlns:a16="http://schemas.microsoft.com/office/drawing/2014/main" id="{B0BA47F7-7362-F54A-859A-56208DD93257}"/>
+              </a:ext>
+            </a:extLst>
+          </p:cNvPr>
+          <p:cNvCxnSpPr>
+            <a:stCxn id="134" idx="2"/>
+            <a:endCxn id="155" idx="2"/>
+          </p:cNvCxnSpPr>
+          <p:nvPr/>
+        </p:nvCxnSpPr>
+        <p:spPr>
+          <a:xfrm rot="16200000" flipH="1">
+            <a:off x="13701094" y="6536686"/>
+            <a:ext cx="765413" cy="2102087"/>
+          </a:xfrm>
+          <a:prstGeom prst="bentConnector2">
+            <a:avLst/>
+          </a:prstGeom>
+          <a:ln w="22225">
+            <a:solidFill>
+              <a:schemeClr val="tx1"/>
+            </a:solidFill>
+            <a:tailEnd type="triangle"/>
+          </a:ln>
+        </p:spPr>
+        <p:style>
+          <a:lnRef idx="1">
+            <a:schemeClr val="accent1"/>
+          </a:lnRef>
+          <a:fillRef idx="0">
+            <a:schemeClr val="accent1"/>
+          </a:fillRef>
+          <a:effectRef idx="0">
+            <a:schemeClr val="accent1"/>
+          </a:effectRef>
+          <a:fontRef idx="minor">
+            <a:schemeClr val="tx1"/>
+          </a:fontRef>
+        </p:style>
+      </p:cxnSp>
+      <p:cxnSp>
+        <p:nvCxnSpPr>
+          <p:cNvPr id="95" name="Straight Arrow Connector 94">
+            <a:extLst>
+              <a:ext uri="{FF2B5EF4-FFF2-40B4-BE49-F238E27FC236}">
+                <a16:creationId xmlns:a16="http://schemas.microsoft.com/office/drawing/2014/main" id="{55DFFB6B-11C4-4E43-9FC0-74369C35DC28}"/>
+              </a:ext>
+            </a:extLst>
+          </p:cNvPr>
+          <p:cNvCxnSpPr>
+            <a:cxnSpLocks/>
+            <a:stCxn id="82" idx="0"/>
+            <a:endCxn id="144" idx="1"/>
+          </p:cNvCxnSpPr>
+          <p:nvPr/>
+        </p:nvCxnSpPr>
+        <p:spPr>
+          <a:xfrm flipV="1">
+            <a:off x="16313280" y="5725945"/>
+            <a:ext cx="409424" cy="20687"/>
+          </a:xfrm>
+          <a:prstGeom prst="straightConnector1">
+            <a:avLst/>
+          </a:prstGeom>
+          <a:ln w="22225">
+            <a:solidFill>
+              <a:schemeClr val="tx1"/>
+            </a:solidFill>
+            <a:tailEnd type="triangle"/>
+          </a:ln>
+        </p:spPr>
+        <p:style>
+          <a:lnRef idx="1">
+            <a:schemeClr val="accent1"/>
+          </a:lnRef>
+          <a:fillRef idx="0">
+            <a:schemeClr val="accent1"/>
+          </a:fillRef>
+          <a:effectRef idx="0">
+            <a:schemeClr val="accent1"/>
+          </a:effectRef>
+          <a:fontRef idx="minor">
+            <a:schemeClr val="tx1"/>
+          </a:fontRef>
+        </p:style>
+      </p:cxnSp>
+      <p:cxnSp>
+        <p:nvCxnSpPr>
+          <p:cNvPr id="98" name="Straight Arrow Connector 97">
+            <a:extLst>
+              <a:ext uri="{FF2B5EF4-FFF2-40B4-BE49-F238E27FC236}">
+                <a16:creationId xmlns:a16="http://schemas.microsoft.com/office/drawing/2014/main" id="{F0DFB588-B0DC-2646-BB06-5BC44C305789}"/>
+              </a:ext>
+            </a:extLst>
+          </p:cNvPr>
+          <p:cNvCxnSpPr>
+            <a:stCxn id="155" idx="0"/>
+            <a:endCxn id="148" idx="1"/>
+          </p:cNvCxnSpPr>
+          <p:nvPr/>
+        </p:nvCxnSpPr>
+        <p:spPr>
+          <a:xfrm flipV="1">
+            <a:off x="16312397" y="7955870"/>
+            <a:ext cx="410307" cy="14567"/>
+          </a:xfrm>
+          <a:prstGeom prst="straightConnector1">
+            <a:avLst/>
+          </a:prstGeom>
+          <a:ln w="22225">
+            <a:solidFill>
+              <a:schemeClr val="tx1"/>
+            </a:solidFill>
+            <a:tailEnd type="triangle"/>
+          </a:ln>
+        </p:spPr>
+        <p:style>
+          <a:lnRef idx="1">
+            <a:schemeClr val="accent1"/>
+          </a:lnRef>
+          <a:fillRef idx="0">
+            <a:schemeClr val="accent1"/>
+          </a:fillRef>
+          <a:effectRef idx="0">
+            <a:schemeClr val="accent1"/>
+          </a:effectRef>
+          <a:fontRef idx="minor">
+            <a:schemeClr val="tx1"/>
+          </a:fontRef>
+        </p:style>
+      </p:cxnSp>
+      <p:cxnSp>
+        <p:nvCxnSpPr>
+          <p:cNvPr id="107" name="Straight Arrow Connector 106">
+            <a:extLst>
+              <a:ext uri="{FF2B5EF4-FFF2-40B4-BE49-F238E27FC236}">
+                <a16:creationId xmlns:a16="http://schemas.microsoft.com/office/drawing/2014/main" id="{09D35231-9F64-0849-9AFD-7AA981028F8E}"/>
+              </a:ext>
+            </a:extLst>
+          </p:cNvPr>
+          <p:cNvCxnSpPr>
+            <a:stCxn id="138" idx="3"/>
+            <a:endCxn id="134" idx="1"/>
+          </p:cNvCxnSpPr>
+          <p:nvPr/>
+        </p:nvCxnSpPr>
+        <p:spPr>
+          <a:xfrm>
+            <a:off x="9808331" y="6665001"/>
+            <a:ext cx="2455781" cy="10192"/>
+          </a:xfrm>
+          <a:prstGeom prst="straightConnector1">
+            <a:avLst/>
+          </a:prstGeom>
+          <a:ln w="22225">
+            <a:solidFill>
+              <a:schemeClr val="tx1"/>
+            </a:solidFill>
+            <a:tailEnd type="triangle"/>
+          </a:ln>
+        </p:spPr>
+        <p:style>
+          <a:lnRef idx="1">
+            <a:schemeClr val="accent1"/>
+          </a:lnRef>
+          <a:fillRef idx="0">
+            <a:schemeClr val="accent1"/>
+          </a:fillRef>
+          <a:effectRef idx="0">
+            <a:schemeClr val="accent1"/>
+          </a:effectRef>
+          <a:fontRef idx="minor">
+            <a:schemeClr val="tx1"/>
+          </a:fontRef>
+        </p:style>
+      </p:cxnSp>
+      <p:sp>
+        <p:nvSpPr>
+          <p:cNvPr id="160" name="TextBox 159">
+            <a:extLst>
+              <a:ext uri="{FF2B5EF4-FFF2-40B4-BE49-F238E27FC236}">
+                <a16:creationId xmlns:a16="http://schemas.microsoft.com/office/drawing/2014/main" id="{E2781AC9-E036-3A43-AA76-D29734A614DF}"/>
+              </a:ext>
+            </a:extLst>
+          </p:cNvPr>
+          <p:cNvSpPr txBox="1"/>
+          <p:nvPr/>
+        </p:nvSpPr>
+        <p:spPr>
+          <a:xfrm>
+            <a:off x="8751847" y="7447870"/>
+            <a:ext cx="520655" cy="369332"/>
+          </a:xfrm>
+          <a:prstGeom prst="rect">
+            <a:avLst/>
+          </a:prstGeom>
+          <a:noFill/>
+        </p:spPr>
+        <p:txBody>
+          <a:bodyPr wrap="none" rtlCol="0">
+            <a:spAutoFit/>
+          </a:bodyPr>
+          <a:lstStyle/>
+          <a:p>
+            <a:r>
+              <a:rPr lang="en-US" dirty="0">
+                <a:latin typeface="Times New Roman" panose="02020603050405020304" pitchFamily="18" charset="0"/>
+                <a:cs typeface="Times New Roman" panose="02020603050405020304" pitchFamily="18" charset="0"/>
+              </a:rPr>
+              <a:t>Yes</a:t>
+            </a:r>
+          </a:p>
+        </p:txBody>
+      </p:sp>
+      <p:sp>
+        <p:nvSpPr>
+          <p:cNvPr id="161" name="TextBox 160">
+            <a:extLst>
+              <a:ext uri="{FF2B5EF4-FFF2-40B4-BE49-F238E27FC236}">
+                <a16:creationId xmlns:a16="http://schemas.microsoft.com/office/drawing/2014/main" id="{67380F84-6544-044E-9371-5CD11B79F787}"/>
+              </a:ext>
+            </a:extLst>
+          </p:cNvPr>
+          <p:cNvSpPr txBox="1"/>
+          <p:nvPr/>
+        </p:nvSpPr>
+        <p:spPr>
+          <a:xfrm>
+            <a:off x="9910242" y="6330840"/>
+            <a:ext cx="466794" cy="369332"/>
+          </a:xfrm>
+          <a:prstGeom prst="rect">
+            <a:avLst/>
+          </a:prstGeom>
+          <a:noFill/>
+        </p:spPr>
+        <p:txBody>
+          <a:bodyPr wrap="none" rtlCol="0">
+            <a:spAutoFit/>
+          </a:bodyPr>
+          <a:lstStyle/>
+          <a:p>
+            <a:r>
+              <a:rPr lang="en-US" dirty="0">
+                <a:latin typeface="Times New Roman" panose="02020603050405020304" pitchFamily="18" charset="0"/>
+                <a:cs typeface="Times New Roman" panose="02020603050405020304" pitchFamily="18" charset="0"/>
+              </a:rPr>
+              <a:t>No</a:t>
+            </a:r>
+          </a:p>
+        </p:txBody>
+      </p:sp>
     </p:spTree>
     <p:extLst>
       <p:ext uri="{BB962C8B-B14F-4D97-AF65-F5344CB8AC3E}">

</xml_diff>